<commit_message>
Slides and exercise fromatting changed
</commit_message>
<xml_diff>
--- a/2_strategy/Cloud Adoption Framework - Strategy-Plan-Ready (L200).pptx
+++ b/2_strategy/Cloud Adoption Framework - Strategy-Plan-Ready (L200).pptx
@@ -286,51 +286,30 @@
 <file path=ppt/changesInfos/changesInfo1.xml><?xml version="1.0" encoding="utf-8"?>
 <pc:chgInfo xmlns:a="http://schemas.openxmlformats.org/drawingml/2006/main" xmlns:r="http://schemas.openxmlformats.org/officeDocument/2006/relationships" xmlns:ac="http://schemas.microsoft.com/office/drawing/2013/main/command" xmlns:pc="http://schemas.microsoft.com/office/powerpoint/2013/main/command">
   <pc:docChgLst>
-    <pc:chgData name="Wayne Meyer" userId="S::wayneme@microsoft.com::505e5828-32a7-4b23-b483-86ab7e4f6d84" providerId="AD" clId="Web-{593F3947-FF3C-5F86-C4C7-0864FF8E9CDF}"/>
-    <pc:docChg chg="modSld">
-      <pc:chgData name="Wayne Meyer" userId="S::wayneme@microsoft.com::505e5828-32a7-4b23-b483-86ab7e4f6d84" providerId="AD" clId="Web-{593F3947-FF3C-5F86-C4C7-0864FF8E9CDF}" dt="2019-09-20T13:32:49.456" v="71"/>
+    <pc:chgData name="Conrad Sidey" userId="S::conrads@microsoft.com::8e7e4c1e-0b9f-408a-a744-9ab8b54b3853" providerId="AD" clId="Web-{CCD6F64E-952F-19B9-0A27-47DBD2AABF4B}"/>
+    <pc:docChg chg="">
+      <pc:chgData name="Conrad Sidey" userId="S::conrads@microsoft.com::8e7e4c1e-0b9f-408a-a744-9ab8b54b3853" providerId="AD" clId="Web-{CCD6F64E-952F-19B9-0A27-47DBD2AABF4B}" dt="2019-09-20T06:55:41.073" v="0"/>
       <pc:docMkLst>
         <pc:docMk/>
       </pc:docMkLst>
-      <pc:sldChg chg="modSp addCm">
-        <pc:chgData name="Wayne Meyer" userId="S::wayneme@microsoft.com::505e5828-32a7-4b23-b483-86ab7e4f6d84" providerId="AD" clId="Web-{593F3947-FF3C-5F86-C4C7-0864FF8E9CDF}" dt="2019-09-20T13:32:49.456" v="71"/>
+      <pc:sldChg chg="addCm">
+        <pc:chgData name="Conrad Sidey" userId="S::conrads@microsoft.com::8e7e4c1e-0b9f-408a-a744-9ab8b54b3853" providerId="AD" clId="Web-{CCD6F64E-952F-19B9-0A27-47DBD2AABF4B}" dt="2019-09-20T06:55:41.073" v="0"/>
         <pc:sldMkLst>
           <pc:docMk/>
           <pc:sldMk cId="2206074536" sldId="1999"/>
         </pc:sldMkLst>
-        <pc:spChg chg="mod">
-          <ac:chgData name="Wayne Meyer" userId="S::wayneme@microsoft.com::505e5828-32a7-4b23-b483-86ab7e4f6d84" providerId="AD" clId="Web-{593F3947-FF3C-5F86-C4C7-0864FF8E9CDF}" dt="2019-09-20T13:32:22.189" v="68" actId="20577"/>
-          <ac:spMkLst>
-            <pc:docMk/>
-            <pc:sldMk cId="2206074536" sldId="1999"/>
-            <ac:spMk id="2" creationId="{00000000-0000-0000-0000-000000000000}"/>
-          </ac:spMkLst>
-        </pc:spChg>
       </pc:sldChg>
-      <pc:sldChg chg="addSp modSp">
-        <pc:chgData name="Wayne Meyer" userId="S::wayneme@microsoft.com::505e5828-32a7-4b23-b483-86ab7e4f6d84" providerId="AD" clId="Web-{593F3947-FF3C-5F86-C4C7-0864FF8E9CDF}" dt="2019-09-20T13:30:43.171" v="32" actId="20577"/>
-        <pc:sldMkLst>
-          <pc:docMk/>
-          <pc:sldMk cId="3600052600" sldId="2076136640"/>
-        </pc:sldMkLst>
-        <pc:spChg chg="add mod">
-          <ac:chgData name="Wayne Meyer" userId="S::wayneme@microsoft.com::505e5828-32a7-4b23-b483-86ab7e4f6d84" providerId="AD" clId="Web-{593F3947-FF3C-5F86-C4C7-0864FF8E9CDF}" dt="2019-09-20T13:30:43.171" v="32" actId="20577"/>
-          <ac:spMkLst>
-            <pc:docMk/>
-            <pc:sldMk cId="3600052600" sldId="2076136640"/>
-            <ac:spMk id="11" creationId="{7B3F2D36-B35E-4B6A-B837-C0ACF97D6ED5}"/>
-          </ac:spMkLst>
-        </pc:spChg>
-      </pc:sldChg>
-      <pc:sldChg chg="addCm">
-        <pc:chgData name="Wayne Meyer" userId="S::wayneme@microsoft.com::505e5828-32a7-4b23-b483-86ab7e4f6d84" providerId="AD" clId="Web-{593F3947-FF3C-5F86-C4C7-0864FF8E9CDF}" dt="2019-09-20T13:31:49.108" v="33"/>
-        <pc:sldMkLst>
-          <pc:docMk/>
-          <pc:sldMk cId="1779733599" sldId="2076136657"/>
-        </pc:sldMkLst>
-      </pc:sldChg>
-      <pc:sldChg chg="addCm">
-        <pc:chgData name="Wayne Meyer" userId="S::wayneme@microsoft.com::505e5828-32a7-4b23-b483-86ab7e4f6d84" providerId="AD" clId="Web-{593F3947-FF3C-5F86-C4C7-0864FF8E9CDF}" dt="2019-09-20T13:29:37.092" v="0"/>
+    </pc:docChg>
+  </pc:docChgLst>
+  <pc:docChgLst>
+    <pc:chgData name="Lee Schuenemeyer" userId="290c3e3b-c057-42fa-bdb3-0cc8072667de" providerId="ADAL" clId="{BF6E392C-870B-4BA3-84D6-4C88F9873242}"/>
+    <pc:docChg chg="">
+      <pc:chgData name="Lee Schuenemeyer" userId="290c3e3b-c057-42fa-bdb3-0cc8072667de" providerId="ADAL" clId="{BF6E392C-870B-4BA3-84D6-4C88F9873242}" dt="2019-09-25T17:24:38.611" v="3" actId="2056"/>
+      <pc:docMkLst>
+        <pc:docMk/>
+      </pc:docMkLst>
+      <pc:sldChg chg="modCm">
+        <pc:chgData name="Lee Schuenemeyer" userId="290c3e3b-c057-42fa-bdb3-0cc8072667de" providerId="ADAL" clId="{BF6E392C-870B-4BA3-84D6-4C88F9873242}" dt="2019-09-25T17:24:38.611" v="3" actId="2056"/>
         <pc:sldMkLst>
           <pc:docMk/>
           <pc:sldMk cId="3216906863" sldId="2076136687"/>
@@ -339,14 +318,53 @@
     </pc:docChg>
   </pc:docChgLst>
   <pc:docChgLst>
-    <pc:chgData name="James Complin" userId="S::jacompli@microsoft.com::04684b05-a571-42a8-b582-bdb318c64b6d" providerId="AD" clId="Web-{6E2BD9A2-79E1-DD20-293F-AB4B63067C62}"/>
+    <pc:chgData name="Janet Thomas" userId="08421ffd-879b-47f6-8d7f-61067c13bd1e" providerId="ADAL" clId="{32BA6DE9-A52C-4CD4-95BA-DA4899EA0E66}"/>
     <pc:docChg chg="">
-      <pc:chgData name="James Complin" userId="S::jacompli@microsoft.com::04684b05-a571-42a8-b582-bdb318c64b6d" providerId="AD" clId="Web-{6E2BD9A2-79E1-DD20-293F-AB4B63067C62}" dt="2019-09-23T12:52:13.169" v="0"/>
+      <pc:chgData name="Janet Thomas" userId="08421ffd-879b-47f6-8d7f-61067c13bd1e" providerId="ADAL" clId="{32BA6DE9-A52C-4CD4-95BA-DA4899EA0E66}" dt="2019-09-17T16:39:48.421" v="0" actId="5900"/>
+      <pc:docMkLst>
+        <pc:docMk/>
+      </pc:docMkLst>
+      <pc:sldChg chg="modCm">
+        <pc:chgData name="Janet Thomas" userId="08421ffd-879b-47f6-8d7f-61067c13bd1e" providerId="ADAL" clId="{32BA6DE9-A52C-4CD4-95BA-DA4899EA0E66}" dt="2019-09-17T16:39:48.421" v="0" actId="5900"/>
+        <pc:sldMkLst>
+          <pc:docMk/>
+          <pc:sldMk cId="3803056413" sldId="2076136638"/>
+        </pc:sldMkLst>
+      </pc:sldChg>
+    </pc:docChg>
+  </pc:docChgLst>
+  <pc:docChgLst>
+    <pc:chgData name="Julie Osburn" userId="S::juliejo@microsoft.com::b2aec404-568e-403a-b1a3-65f4a6e1880d" providerId="AD" clId="Web-{582D52EE-84D2-81B1-8E44-909045FA1117}"/>
+    <pc:docChg chg="">
+      <pc:chgData name="Julie Osburn" userId="S::juliejo@microsoft.com::b2aec404-568e-403a-b1a3-65f4a6e1880d" providerId="AD" clId="Web-{582D52EE-84D2-81B1-8E44-909045FA1117}" dt="2019-09-23T17:37:33.914" v="0"/>
       <pc:docMkLst>
         <pc:docMk/>
       </pc:docMkLst>
       <pc:sldChg chg="addCm">
-        <pc:chgData name="James Complin" userId="S::jacompli@microsoft.com::04684b05-a571-42a8-b582-bdb318c64b6d" providerId="AD" clId="Web-{6E2BD9A2-79E1-DD20-293F-AB4B63067C62}" dt="2019-09-23T12:52:13.169" v="0"/>
+        <pc:chgData name="Julie Osburn" userId="S::juliejo@microsoft.com::b2aec404-568e-403a-b1a3-65f4a6e1880d" providerId="AD" clId="Web-{582D52EE-84D2-81B1-8E44-909045FA1117}" dt="2019-09-23T17:37:33.914" v="0"/>
+        <pc:sldMkLst>
+          <pc:docMk/>
+          <pc:sldMk cId="3600052600" sldId="2076136640"/>
+        </pc:sldMkLst>
+      </pc:sldChg>
+    </pc:docChg>
+  </pc:docChgLst>
+  <pc:docChgLst>
+    <pc:chgData name="James Complin" userId="S::jacompli@microsoft.com::04684b05-a571-42a8-b582-bdb318c64b6d" providerId="AD" clId="Web-{9CB0BFD4-FEC2-8CF2-4C10-4C7CBFAFF638}"/>
+    <pc:docChg chg="">
+      <pc:chgData name="James Complin" userId="S::jacompli@microsoft.com::04684b05-a571-42a8-b582-bdb318c64b6d" providerId="AD" clId="Web-{9CB0BFD4-FEC2-8CF2-4C10-4C7CBFAFF638}" dt="2019-09-20T20:33:27.980" v="1"/>
+      <pc:docMkLst>
+        <pc:docMk/>
+      </pc:docMkLst>
+      <pc:sldChg chg="addCm">
+        <pc:chgData name="James Complin" userId="S::jacompli@microsoft.com::04684b05-a571-42a8-b582-bdb318c64b6d" providerId="AD" clId="Web-{9CB0BFD4-FEC2-8CF2-4C10-4C7CBFAFF638}" dt="2019-09-20T20:33:27.980" v="1"/>
+        <pc:sldMkLst>
+          <pc:docMk/>
+          <pc:sldMk cId="1359849352" sldId="10557"/>
+        </pc:sldMkLst>
+      </pc:sldChg>
+      <pc:sldChg chg="addCm">
+        <pc:chgData name="James Complin" userId="S::jacompli@microsoft.com::04684b05-a571-42a8-b582-bdb318c64b6d" providerId="AD" clId="Web-{9CB0BFD4-FEC2-8CF2-4C10-4C7CBFAFF638}" dt="2019-09-20T20:30:55.762" v="0"/>
         <pc:sldMkLst>
           <pc:docMk/>
           <pc:sldMk cId="1779733599" sldId="2076136657"/>
@@ -355,17 +373,53 @@
     </pc:docChg>
   </pc:docChgLst>
   <pc:docChgLst>
-    <pc:chgData name="Pablo Sanchez" userId="S::pablosp@microsoft.com::0f48470a-3c87-4ba9-ac2f-63e38402478e" providerId="AD" clId="Web-{18057856-640E-5ADB-1ABF-B74462082AF2}"/>
-    <pc:docChg chg="">
-      <pc:chgData name="Pablo Sanchez" userId="S::pablosp@microsoft.com::0f48470a-3c87-4ba9-ac2f-63e38402478e" providerId="AD" clId="Web-{18057856-640E-5ADB-1ABF-B74462082AF2}" dt="2019-09-24T19:39:25.095" v="0"/>
+    <pc:chgData name="David Coulter" userId="bd7f51f3-86ab-4183-af7c-70e0e78624e3" providerId="ADAL" clId="{25D832D8-7F7B-4D7D-A4D9-663A9C52B598}"/>
+    <pc:docChg chg="custSel modSld">
+      <pc:chgData name="David Coulter" userId="bd7f51f3-86ab-4183-af7c-70e0e78624e3" providerId="ADAL" clId="{25D832D8-7F7B-4D7D-A4D9-663A9C52B598}" dt="2019-09-23T15:31:59.244" v="18" actId="1589"/>
       <pc:docMkLst>
         <pc:docMk/>
       </pc:docMkLst>
-      <pc:sldChg chg="addCm">
-        <pc:chgData name="Pablo Sanchez" userId="S::pablosp@microsoft.com::0f48470a-3c87-4ba9-ac2f-63e38402478e" providerId="AD" clId="Web-{18057856-640E-5ADB-1ABF-B74462082AF2}" dt="2019-09-24T19:39:25.095" v="0"/>
+      <pc:sldChg chg="addCm modCm">
+        <pc:chgData name="David Coulter" userId="bd7f51f3-86ab-4183-af7c-70e0e78624e3" providerId="ADAL" clId="{25D832D8-7F7B-4D7D-A4D9-663A9C52B598}" dt="2019-09-23T04:35:13.628" v="14" actId="1589"/>
         <pc:sldMkLst>
           <pc:docMk/>
-          <pc:sldMk cId="4085166417" sldId="2076136682"/>
+          <pc:sldMk cId="141977664" sldId="2076136639"/>
+        </pc:sldMkLst>
+      </pc:sldChg>
+      <pc:sldChg chg="addCm modCm">
+        <pc:chgData name="David Coulter" userId="bd7f51f3-86ab-4183-af7c-70e0e78624e3" providerId="ADAL" clId="{25D832D8-7F7B-4D7D-A4D9-663A9C52B598}" dt="2019-09-23T04:40:10.967" v="17" actId="2056"/>
+        <pc:sldMkLst>
+          <pc:docMk/>
+          <pc:sldMk cId="3600052600" sldId="2076136640"/>
+        </pc:sldMkLst>
+      </pc:sldChg>
+      <pc:sldChg chg="addCm modCm">
+        <pc:chgData name="David Coulter" userId="bd7f51f3-86ab-4183-af7c-70e0e78624e3" providerId="ADAL" clId="{25D832D8-7F7B-4D7D-A4D9-663A9C52B598}" dt="2019-09-23T15:31:59.244" v="18" actId="1589"/>
+        <pc:sldMkLst>
+          <pc:docMk/>
+          <pc:sldMk cId="2045845977" sldId="2076136653"/>
+        </pc:sldMkLst>
+      </pc:sldChg>
+      <pc:sldChg chg="modSp mod">
+        <pc:chgData name="David Coulter" userId="bd7f51f3-86ab-4183-af7c-70e0e78624e3" providerId="ADAL" clId="{25D832D8-7F7B-4D7D-A4D9-663A9C52B598}" dt="2019-09-22T16:59:27.402" v="10" actId="20577"/>
+        <pc:sldMkLst>
+          <pc:docMk/>
+          <pc:sldMk cId="2400275843" sldId="2076136681"/>
+        </pc:sldMkLst>
+        <pc:spChg chg="mod">
+          <ac:chgData name="David Coulter" userId="bd7f51f3-86ab-4183-af7c-70e0e78624e3" providerId="ADAL" clId="{25D832D8-7F7B-4D7D-A4D9-663A9C52B598}" dt="2019-09-22T16:59:27.402" v="10" actId="20577"/>
+          <ac:spMkLst>
+            <pc:docMk/>
+            <pc:sldMk cId="2400275843" sldId="2076136681"/>
+            <ac:spMk id="3" creationId="{44CBCD13-CA19-4BFA-BCE8-529AB9F3F9B3}"/>
+          </ac:spMkLst>
+        </pc:spChg>
+      </pc:sldChg>
+      <pc:sldChg chg="addCm modCm">
+        <pc:chgData name="David Coulter" userId="bd7f51f3-86ab-4183-af7c-70e0e78624e3" providerId="ADAL" clId="{25D832D8-7F7B-4D7D-A4D9-663A9C52B598}" dt="2019-09-22T16:52:54.803" v="2" actId="2056"/>
+        <pc:sldMkLst>
+          <pc:docMk/>
+          <pc:sldMk cId="3216906863" sldId="2076136687"/>
         </pc:sldMkLst>
       </pc:sldChg>
     </pc:docChg>
@@ -438,19 +492,12 @@
     </pc:docChg>
   </pc:docChgLst>
   <pc:docChgLst>
-    <pc:chgData name="Julie Osburn" userId="S::juliejo@microsoft.com::b2aec404-568e-403a-b1a3-65f4a6e1880d" providerId="AD" clId="Web-{582D52EE-84D2-81B1-8E44-909045FA1117}"/>
-    <pc:docChg chg="">
-      <pc:chgData name="Julie Osburn" userId="S::juliejo@microsoft.com::b2aec404-568e-403a-b1a3-65f4a6e1880d" providerId="AD" clId="Web-{582D52EE-84D2-81B1-8E44-909045FA1117}" dt="2019-09-23T17:37:33.914" v="0"/>
+    <pc:chgData name="Janet Thomas" userId="08421ffd-879b-47f6-8d7f-61067c13bd1e" providerId="ADAL" clId="{E1C964E4-6D26-4EBA-B07F-DB51A2804AD0}"/>
+    <pc:docChg chg="modSld">
+      <pc:chgData name="Janet Thomas" userId="08421ffd-879b-47f6-8d7f-61067c13bd1e" providerId="ADAL" clId="{E1C964E4-6D26-4EBA-B07F-DB51A2804AD0}" dt="2019-09-30T20:37:57.049" v="0"/>
       <pc:docMkLst>
         <pc:docMk/>
       </pc:docMkLst>
-      <pc:sldChg chg="addCm">
-        <pc:chgData name="Julie Osburn" userId="S::juliejo@microsoft.com::b2aec404-568e-403a-b1a3-65f4a6e1880d" providerId="AD" clId="Web-{582D52EE-84D2-81B1-8E44-909045FA1117}" dt="2019-09-23T17:37:33.914" v="0"/>
-        <pc:sldMkLst>
-          <pc:docMk/>
-          <pc:sldMk cId="3600052600" sldId="2076136640"/>
-        </pc:sldMkLst>
-      </pc:sldChg>
     </pc:docChg>
   </pc:docChgLst>
   <pc:docChgLst>
@@ -926,6 +973,125 @@
     </pc:docChg>
   </pc:docChgLst>
   <pc:docChgLst>
+    <pc:chgData name="James Complin" userId="S::jacompli@microsoft.com::04684b05-a571-42a8-b582-bdb318c64b6d" providerId="AD" clId="Web-{72A9CA45-1B51-36FB-7CDA-4C74B3F93E4F}"/>
+    <pc:docChg chg="">
+      <pc:chgData name="James Complin" userId="S::jacompli@microsoft.com::04684b05-a571-42a8-b582-bdb318c64b6d" providerId="AD" clId="Web-{72A9CA45-1B51-36FB-7CDA-4C74B3F93E4F}" dt="2019-09-20T06:38:40.736" v="4"/>
+      <pc:docMkLst>
+        <pc:docMk/>
+      </pc:docMkLst>
+      <pc:sldChg chg="addCm">
+        <pc:chgData name="James Complin" userId="S::jacompli@microsoft.com::04684b05-a571-42a8-b582-bdb318c64b6d" providerId="AD" clId="Web-{72A9CA45-1B51-36FB-7CDA-4C74B3F93E4F}" dt="2019-09-20T05:31:31.619" v="2"/>
+        <pc:sldMkLst>
+          <pc:docMk/>
+          <pc:sldMk cId="3803056413" sldId="2076136638"/>
+        </pc:sldMkLst>
+      </pc:sldChg>
+      <pc:sldChg chg="addCm">
+        <pc:chgData name="James Complin" userId="S::jacompli@microsoft.com::04684b05-a571-42a8-b582-bdb318c64b6d" providerId="AD" clId="Web-{72A9CA45-1B51-36FB-7CDA-4C74B3F93E4F}" dt="2019-09-20T06:38:40.736" v="4"/>
+        <pc:sldMkLst>
+          <pc:docMk/>
+          <pc:sldMk cId="3600052600" sldId="2076136640"/>
+        </pc:sldMkLst>
+      </pc:sldChg>
+      <pc:sldChg chg="addCm">
+        <pc:chgData name="James Complin" userId="S::jacompli@microsoft.com::04684b05-a571-42a8-b582-bdb318c64b6d" providerId="AD" clId="Web-{72A9CA45-1B51-36FB-7CDA-4C74B3F93E4F}" dt="2019-09-20T05:31:00.197" v="1"/>
+        <pc:sldMkLst>
+          <pc:docMk/>
+          <pc:sldMk cId="3216906863" sldId="2076136687"/>
+        </pc:sldMkLst>
+      </pc:sldChg>
+    </pc:docChg>
+  </pc:docChgLst>
+  <pc:docChgLst>
+    <pc:chgData name="Johan Grant" userId="S::jogrant@microsoft.com::4c19665d-e4ad-4a0a-a05e-a1053f6c6b5c" providerId="AD" clId="Web-{BC6688CD-D7BA-155E-1F59-9A2F9762427F}"/>
+    <pc:docChg chg="">
+      <pc:chgData name="Johan Grant" userId="S::jogrant@microsoft.com::4c19665d-e4ad-4a0a-a05e-a1053f6c6b5c" providerId="AD" clId="Web-{BC6688CD-D7BA-155E-1F59-9A2F9762427F}" dt="2019-09-23T03:10:30.651" v="14"/>
+      <pc:docMkLst>
+        <pc:docMk/>
+      </pc:docMkLst>
+      <pc:sldChg chg="addCm">
+        <pc:chgData name="Johan Grant" userId="S::jogrant@microsoft.com::4c19665d-e4ad-4a0a-a05e-a1053f6c6b5c" providerId="AD" clId="Web-{BC6688CD-D7BA-155E-1F59-9A2F9762427F}" dt="2019-09-23T01:43:37.205" v="5"/>
+        <pc:sldMkLst>
+          <pc:docMk/>
+          <pc:sldMk cId="837477126" sldId="2076136632"/>
+        </pc:sldMkLst>
+      </pc:sldChg>
+      <pc:sldChg chg="addCm">
+        <pc:chgData name="Johan Grant" userId="S::jogrant@microsoft.com::4c19665d-e4ad-4a0a-a05e-a1053f6c6b5c" providerId="AD" clId="Web-{BC6688CD-D7BA-155E-1F59-9A2F9762427F}" dt="2019-09-23T01:37:26.761" v="2"/>
+        <pc:sldMkLst>
+          <pc:docMk/>
+          <pc:sldMk cId="3600052600" sldId="2076136640"/>
+        </pc:sldMkLst>
+      </pc:sldChg>
+      <pc:sldChg chg="addCm delCm modCm">
+        <pc:chgData name="Johan Grant" userId="S::jogrant@microsoft.com::4c19665d-e4ad-4a0a-a05e-a1053f6c6b5c" providerId="AD" clId="Web-{BC6688CD-D7BA-155E-1F59-9A2F9762427F}" dt="2019-09-23T01:49:31.092" v="10"/>
+        <pc:sldMkLst>
+          <pc:docMk/>
+          <pc:sldMk cId="3373473442" sldId="2076136642"/>
+        </pc:sldMkLst>
+      </pc:sldChg>
+      <pc:sldChg chg="addCm">
+        <pc:chgData name="Johan Grant" userId="S::jogrant@microsoft.com::4c19665d-e4ad-4a0a-a05e-a1053f6c6b5c" providerId="AD" clId="Web-{BC6688CD-D7BA-155E-1F59-9A2F9762427F}" dt="2019-09-23T01:50:15.281" v="11"/>
+        <pc:sldMkLst>
+          <pc:docMk/>
+          <pc:sldMk cId="1352040138" sldId="2076136648"/>
+        </pc:sldMkLst>
+      </pc:sldChg>
+      <pc:sldChg chg="addCm modCm">
+        <pc:chgData name="Johan Grant" userId="S::jogrant@microsoft.com::4c19665d-e4ad-4a0a-a05e-a1053f6c6b5c" providerId="AD" clId="Web-{BC6688CD-D7BA-155E-1F59-9A2F9762427F}" dt="2019-09-23T03:09:48.479" v="13"/>
+        <pc:sldMkLst>
+          <pc:docMk/>
+          <pc:sldMk cId="3675644745" sldId="2076136651"/>
+        </pc:sldMkLst>
+      </pc:sldChg>
+      <pc:sldChg chg="addCm">
+        <pc:chgData name="Johan Grant" userId="S::jogrant@microsoft.com::4c19665d-e4ad-4a0a-a05e-a1053f6c6b5c" providerId="AD" clId="Web-{BC6688CD-D7BA-155E-1F59-9A2F9762427F}" dt="2019-09-23T03:10:30.651" v="14"/>
+        <pc:sldMkLst>
+          <pc:docMk/>
+          <pc:sldMk cId="2045845977" sldId="2076136653"/>
+        </pc:sldMkLst>
+      </pc:sldChg>
+      <pc:sldChg chg="addCm">
+        <pc:chgData name="Johan Grant" userId="S::jogrant@microsoft.com::4c19665d-e4ad-4a0a-a05e-a1053f6c6b5c" providerId="AD" clId="Web-{BC6688CD-D7BA-155E-1F59-9A2F9762427F}" dt="2019-09-23T01:40:00.516" v="3"/>
+        <pc:sldMkLst>
+          <pc:docMk/>
+          <pc:sldMk cId="2792427332" sldId="2076136654"/>
+        </pc:sldMkLst>
+      </pc:sldChg>
+      <pc:sldChg chg="addCm">
+        <pc:chgData name="Johan Grant" userId="S::jogrant@microsoft.com::4c19665d-e4ad-4a0a-a05e-a1053f6c6b5c" providerId="AD" clId="Web-{BC6688CD-D7BA-155E-1F59-9A2F9762427F}" dt="2019-09-23T01:41:38.830" v="4"/>
+        <pc:sldMkLst>
+          <pc:docMk/>
+          <pc:sldMk cId="2400275843" sldId="2076136681"/>
+        </pc:sldMkLst>
+      </pc:sldChg>
+    </pc:docChg>
+  </pc:docChgLst>
+  <pc:docChgLst>
+    <pc:chgData name="Lorand Farkas" userId="6dd8c035-74a1-41f1-bcf4-8d01c12b1819" providerId="ADAL" clId="{0403F691-11D7-E549-B47E-F2649B2B3781}"/>
+    <pc:docChg chg="modSld">
+      <pc:chgData name="Lorand Farkas" userId="6dd8c035-74a1-41f1-bcf4-8d01c12b1819" providerId="ADAL" clId="{0403F691-11D7-E549-B47E-F2649B2B3781}" dt="2019-10-08T19:23:03.923" v="0" actId="1076"/>
+      <pc:docMkLst>
+        <pc:docMk/>
+      </pc:docMkLst>
+      <pc:sldChg chg="modSp">
+        <pc:chgData name="Lorand Farkas" userId="6dd8c035-74a1-41f1-bcf4-8d01c12b1819" providerId="ADAL" clId="{0403F691-11D7-E549-B47E-F2649B2B3781}" dt="2019-10-08T19:23:03.923" v="0" actId="1076"/>
+        <pc:sldMkLst>
+          <pc:docMk/>
+          <pc:sldMk cId="141977664" sldId="2076136639"/>
+        </pc:sldMkLst>
+        <pc:spChg chg="mod">
+          <ac:chgData name="Lorand Farkas" userId="6dd8c035-74a1-41f1-bcf4-8d01c12b1819" providerId="ADAL" clId="{0403F691-11D7-E549-B47E-F2649B2B3781}" dt="2019-10-08T19:23:03.923" v="0" actId="1076"/>
+          <ac:spMkLst>
+            <pc:docMk/>
+            <pc:sldMk cId="141977664" sldId="2076136639"/>
+            <ac:spMk id="8" creationId="{4E2D9699-B376-479B-BAF2-880A1A0D0335}"/>
+          </ac:spMkLst>
+        </pc:spChg>
+      </pc:sldChg>
+    </pc:docChg>
+  </pc:docChgLst>
+  <pc:docChgLst>
     <pc:chgData name="Wayne Meyer" userId="505e5828-32a7-4b23-b483-86ab7e4f6d84" providerId="ADAL" clId="{732092DD-500E-4ABF-849B-CDC879E857EB}"/>
     <pc:docChg chg="undo custSel addSld modSld sldOrd addSection">
       <pc:chgData name="Wayne Meyer" userId="505e5828-32a7-4b23-b483-86ab7e4f6d84" providerId="ADAL" clId="{732092DD-500E-4ABF-849B-CDC879E857EB}" dt="2019-10-04T19:34:53.569" v="4910" actId="20577"/>
@@ -1285,6 +1451,68 @@
     </pc:docChg>
   </pc:docChgLst>
   <pc:docChgLst>
+    <pc:chgData name="James Complin" userId="S::jacompli@microsoft.com::04684b05-a571-42a8-b582-bdb318c64b6d" providerId="AD" clId="Web-{6E2BD9A2-79E1-DD20-293F-AB4B63067C62}"/>
+    <pc:docChg chg="">
+      <pc:chgData name="James Complin" userId="S::jacompli@microsoft.com::04684b05-a571-42a8-b582-bdb318c64b6d" providerId="AD" clId="Web-{6E2BD9A2-79E1-DD20-293F-AB4B63067C62}" dt="2019-09-23T12:52:13.169" v="0"/>
+      <pc:docMkLst>
+        <pc:docMk/>
+      </pc:docMkLst>
+      <pc:sldChg chg="addCm">
+        <pc:chgData name="James Complin" userId="S::jacompli@microsoft.com::04684b05-a571-42a8-b582-bdb318c64b6d" providerId="AD" clId="Web-{6E2BD9A2-79E1-DD20-293F-AB4B63067C62}" dt="2019-09-23T12:52:13.169" v="0"/>
+        <pc:sldMkLst>
+          <pc:docMk/>
+          <pc:sldMk cId="1779733599" sldId="2076136657"/>
+        </pc:sldMkLst>
+      </pc:sldChg>
+    </pc:docChg>
+  </pc:docChgLst>
+  <pc:docChgLst>
+    <pc:chgData name="Pablo Sanchez" userId="S::pablosp@microsoft.com::0f48470a-3c87-4ba9-ac2f-63e38402478e" providerId="AD" clId="Web-{18057856-640E-5ADB-1ABF-B74462082AF2}"/>
+    <pc:docChg chg="">
+      <pc:chgData name="Pablo Sanchez" userId="S::pablosp@microsoft.com::0f48470a-3c87-4ba9-ac2f-63e38402478e" providerId="AD" clId="Web-{18057856-640E-5ADB-1ABF-B74462082AF2}" dt="2019-09-24T19:39:25.095" v="0"/>
+      <pc:docMkLst>
+        <pc:docMk/>
+      </pc:docMkLst>
+      <pc:sldChg chg="addCm">
+        <pc:chgData name="Pablo Sanchez" userId="S::pablosp@microsoft.com::0f48470a-3c87-4ba9-ac2f-63e38402478e" providerId="AD" clId="Web-{18057856-640E-5ADB-1ABF-B74462082AF2}" dt="2019-09-24T19:39:25.095" v="0"/>
+        <pc:sldMkLst>
+          <pc:docMk/>
+          <pc:sldMk cId="4085166417" sldId="2076136682"/>
+        </pc:sldMkLst>
+      </pc:sldChg>
+    </pc:docChg>
+  </pc:docChgLst>
+  <pc:docChgLst>
+    <pc:chgData name="Ansley Yeo" userId="S::ansyeo@microsoft.com::0d040379-8e93-4226-9271-d416b2176717" providerId="AD" clId="Web-{D40DB876-651A-A59F-FB3A-183FEF4FCFF6}"/>
+    <pc:docChg chg="">
+      <pc:chgData name="Ansley Yeo" userId="S::ansyeo@microsoft.com::0d040379-8e93-4226-9271-d416b2176717" providerId="AD" clId="Web-{D40DB876-651A-A59F-FB3A-183FEF4FCFF6}" dt="2019-09-25T11:36:18.460" v="7"/>
+      <pc:docMkLst>
+        <pc:docMk/>
+      </pc:docMkLst>
+      <pc:sldChg chg="addCm">
+        <pc:chgData name="Ansley Yeo" userId="S::ansyeo@microsoft.com::0d040379-8e93-4226-9271-d416b2176717" providerId="AD" clId="Web-{D40DB876-651A-A59F-FB3A-183FEF4FCFF6}" dt="2019-09-25T11:26:59.153" v="3"/>
+        <pc:sldMkLst>
+          <pc:docMk/>
+          <pc:sldMk cId="2045845977" sldId="2076136653"/>
+        </pc:sldMkLst>
+      </pc:sldChg>
+      <pc:sldChg chg="modCm">
+        <pc:chgData name="Ansley Yeo" userId="S::ansyeo@microsoft.com::0d040379-8e93-4226-9271-d416b2176717" providerId="AD" clId="Web-{D40DB876-651A-A59F-FB3A-183FEF4FCFF6}" dt="2019-09-25T08:19:55.584" v="2"/>
+        <pc:sldMkLst>
+          <pc:docMk/>
+          <pc:sldMk cId="2400275843" sldId="2076136681"/>
+        </pc:sldMkLst>
+      </pc:sldChg>
+      <pc:sldChg chg="addCm modCm">
+        <pc:chgData name="Ansley Yeo" userId="S::ansyeo@microsoft.com::0d040379-8e93-4226-9271-d416b2176717" providerId="AD" clId="Web-{D40DB876-651A-A59F-FB3A-183FEF4FCFF6}" dt="2019-09-25T11:36:18.460" v="7"/>
+        <pc:sldMkLst>
+          <pc:docMk/>
+          <pc:sldMk cId="2252954663" sldId="2076136684"/>
+        </pc:sldMkLst>
+      </pc:sldChg>
+    </pc:docChg>
+  </pc:docChgLst>
+  <pc:docChgLst>
     <pc:chgData name="Pablo Sanchez" userId="S::pablosp@microsoft.com::0f48470a-3c87-4ba9-ac2f-63e38402478e" providerId="AD" clId="Web-{1776EB47-A47E-3EE9-F928-DADD6C1AD11B}"/>
     <pc:docChg chg="">
       <pc:chgData name="Pablo Sanchez" userId="S::pablosp@microsoft.com::0f48470a-3c87-4ba9-ac2f-63e38402478e" providerId="AD" clId="Web-{1776EB47-A47E-3EE9-F928-DADD6C1AD11B}" dt="2019-09-23T20:17:32.994" v="8"/>
@@ -1350,279 +1578,51 @@
     </pc:docChg>
   </pc:docChgLst>
   <pc:docChgLst>
-    <pc:chgData name="Johan Grant" userId="S::jogrant@microsoft.com::4c19665d-e4ad-4a0a-a05e-a1053f6c6b5c" providerId="AD" clId="Web-{BC6688CD-D7BA-155E-1F59-9A2F9762427F}"/>
-    <pc:docChg chg="">
-      <pc:chgData name="Johan Grant" userId="S::jogrant@microsoft.com::4c19665d-e4ad-4a0a-a05e-a1053f6c6b5c" providerId="AD" clId="Web-{BC6688CD-D7BA-155E-1F59-9A2F9762427F}" dt="2019-09-23T03:10:30.651" v="14"/>
+    <pc:chgData name="Wayne Meyer" userId="S::wayneme@microsoft.com::505e5828-32a7-4b23-b483-86ab7e4f6d84" providerId="AD" clId="Web-{593F3947-FF3C-5F86-C4C7-0864FF8E9CDF}"/>
+    <pc:docChg chg="modSld">
+      <pc:chgData name="Wayne Meyer" userId="S::wayneme@microsoft.com::505e5828-32a7-4b23-b483-86ab7e4f6d84" providerId="AD" clId="Web-{593F3947-FF3C-5F86-C4C7-0864FF8E9CDF}" dt="2019-09-20T13:32:49.456" v="71"/>
       <pc:docMkLst>
         <pc:docMk/>
       </pc:docMkLst>
-      <pc:sldChg chg="addCm">
-        <pc:chgData name="Johan Grant" userId="S::jogrant@microsoft.com::4c19665d-e4ad-4a0a-a05e-a1053f6c6b5c" providerId="AD" clId="Web-{BC6688CD-D7BA-155E-1F59-9A2F9762427F}" dt="2019-09-23T01:43:37.205" v="5"/>
+      <pc:sldChg chg="modSp addCm">
+        <pc:chgData name="Wayne Meyer" userId="S::wayneme@microsoft.com::505e5828-32a7-4b23-b483-86ab7e4f6d84" providerId="AD" clId="Web-{593F3947-FF3C-5F86-C4C7-0864FF8E9CDF}" dt="2019-09-20T13:32:49.456" v="71"/>
         <pc:sldMkLst>
           <pc:docMk/>
-          <pc:sldMk cId="837477126" sldId="2076136632"/>
+          <pc:sldMk cId="2206074536" sldId="1999"/>
         </pc:sldMkLst>
+        <pc:spChg chg="mod">
+          <ac:chgData name="Wayne Meyer" userId="S::wayneme@microsoft.com::505e5828-32a7-4b23-b483-86ab7e4f6d84" providerId="AD" clId="Web-{593F3947-FF3C-5F86-C4C7-0864FF8E9CDF}" dt="2019-09-20T13:32:22.189" v="68" actId="20577"/>
+          <ac:spMkLst>
+            <pc:docMk/>
+            <pc:sldMk cId="2206074536" sldId="1999"/>
+            <ac:spMk id="2" creationId="{00000000-0000-0000-0000-000000000000}"/>
+          </ac:spMkLst>
+        </pc:spChg>
       </pc:sldChg>
-      <pc:sldChg chg="addCm">
-        <pc:chgData name="Johan Grant" userId="S::jogrant@microsoft.com::4c19665d-e4ad-4a0a-a05e-a1053f6c6b5c" providerId="AD" clId="Web-{BC6688CD-D7BA-155E-1F59-9A2F9762427F}" dt="2019-09-23T01:37:26.761" v="2"/>
+      <pc:sldChg chg="addSp modSp">
+        <pc:chgData name="Wayne Meyer" userId="S::wayneme@microsoft.com::505e5828-32a7-4b23-b483-86ab7e4f6d84" providerId="AD" clId="Web-{593F3947-FF3C-5F86-C4C7-0864FF8E9CDF}" dt="2019-09-20T13:30:43.171" v="32" actId="20577"/>
         <pc:sldMkLst>
           <pc:docMk/>
           <pc:sldMk cId="3600052600" sldId="2076136640"/>
         </pc:sldMkLst>
-      </pc:sldChg>
-      <pc:sldChg chg="addCm delCm modCm">
-        <pc:chgData name="Johan Grant" userId="S::jogrant@microsoft.com::4c19665d-e4ad-4a0a-a05e-a1053f6c6b5c" providerId="AD" clId="Web-{BC6688CD-D7BA-155E-1F59-9A2F9762427F}" dt="2019-09-23T01:49:31.092" v="10"/>
-        <pc:sldMkLst>
-          <pc:docMk/>
-          <pc:sldMk cId="3373473442" sldId="2076136642"/>
-        </pc:sldMkLst>
-      </pc:sldChg>
-      <pc:sldChg chg="addCm">
-        <pc:chgData name="Johan Grant" userId="S::jogrant@microsoft.com::4c19665d-e4ad-4a0a-a05e-a1053f6c6b5c" providerId="AD" clId="Web-{BC6688CD-D7BA-155E-1F59-9A2F9762427F}" dt="2019-09-23T01:50:15.281" v="11"/>
-        <pc:sldMkLst>
-          <pc:docMk/>
-          <pc:sldMk cId="1352040138" sldId="2076136648"/>
-        </pc:sldMkLst>
-      </pc:sldChg>
-      <pc:sldChg chg="addCm modCm">
-        <pc:chgData name="Johan Grant" userId="S::jogrant@microsoft.com::4c19665d-e4ad-4a0a-a05e-a1053f6c6b5c" providerId="AD" clId="Web-{BC6688CD-D7BA-155E-1F59-9A2F9762427F}" dt="2019-09-23T03:09:48.479" v="13"/>
-        <pc:sldMkLst>
-          <pc:docMk/>
-          <pc:sldMk cId="3675644745" sldId="2076136651"/>
-        </pc:sldMkLst>
-      </pc:sldChg>
-      <pc:sldChg chg="addCm">
-        <pc:chgData name="Johan Grant" userId="S::jogrant@microsoft.com::4c19665d-e4ad-4a0a-a05e-a1053f6c6b5c" providerId="AD" clId="Web-{BC6688CD-D7BA-155E-1F59-9A2F9762427F}" dt="2019-09-23T03:10:30.651" v="14"/>
-        <pc:sldMkLst>
-          <pc:docMk/>
-          <pc:sldMk cId="2045845977" sldId="2076136653"/>
-        </pc:sldMkLst>
-      </pc:sldChg>
-      <pc:sldChg chg="addCm">
-        <pc:chgData name="Johan Grant" userId="S::jogrant@microsoft.com::4c19665d-e4ad-4a0a-a05e-a1053f6c6b5c" providerId="AD" clId="Web-{BC6688CD-D7BA-155E-1F59-9A2F9762427F}" dt="2019-09-23T01:40:00.516" v="3"/>
-        <pc:sldMkLst>
-          <pc:docMk/>
-          <pc:sldMk cId="2792427332" sldId="2076136654"/>
-        </pc:sldMkLst>
-      </pc:sldChg>
-      <pc:sldChg chg="addCm">
-        <pc:chgData name="Johan Grant" userId="S::jogrant@microsoft.com::4c19665d-e4ad-4a0a-a05e-a1053f6c6b5c" providerId="AD" clId="Web-{BC6688CD-D7BA-155E-1F59-9A2F9762427F}" dt="2019-09-23T01:41:38.830" v="4"/>
-        <pc:sldMkLst>
-          <pc:docMk/>
-          <pc:sldMk cId="2400275843" sldId="2076136681"/>
-        </pc:sldMkLst>
-      </pc:sldChg>
-    </pc:docChg>
-  </pc:docChgLst>
-  <pc:docChgLst>
-    <pc:chgData name="James Complin" userId="S::jacompli@microsoft.com::04684b05-a571-42a8-b582-bdb318c64b6d" providerId="AD" clId="Web-{72A9CA45-1B51-36FB-7CDA-4C74B3F93E4F}"/>
-    <pc:docChg chg="">
-      <pc:chgData name="James Complin" userId="S::jacompli@microsoft.com::04684b05-a571-42a8-b582-bdb318c64b6d" providerId="AD" clId="Web-{72A9CA45-1B51-36FB-7CDA-4C74B3F93E4F}" dt="2019-09-20T06:38:40.736" v="4"/>
-      <pc:docMkLst>
-        <pc:docMk/>
-      </pc:docMkLst>
-      <pc:sldChg chg="addCm">
-        <pc:chgData name="James Complin" userId="S::jacompli@microsoft.com::04684b05-a571-42a8-b582-bdb318c64b6d" providerId="AD" clId="Web-{72A9CA45-1B51-36FB-7CDA-4C74B3F93E4F}" dt="2019-09-20T05:31:31.619" v="2"/>
-        <pc:sldMkLst>
-          <pc:docMk/>
-          <pc:sldMk cId="3803056413" sldId="2076136638"/>
-        </pc:sldMkLst>
-      </pc:sldChg>
-      <pc:sldChg chg="addCm">
-        <pc:chgData name="James Complin" userId="S::jacompli@microsoft.com::04684b05-a571-42a8-b582-bdb318c64b6d" providerId="AD" clId="Web-{72A9CA45-1B51-36FB-7CDA-4C74B3F93E4F}" dt="2019-09-20T06:38:40.736" v="4"/>
-        <pc:sldMkLst>
-          <pc:docMk/>
-          <pc:sldMk cId="3600052600" sldId="2076136640"/>
-        </pc:sldMkLst>
-      </pc:sldChg>
-      <pc:sldChg chg="addCm">
-        <pc:chgData name="James Complin" userId="S::jacompli@microsoft.com::04684b05-a571-42a8-b582-bdb318c64b6d" providerId="AD" clId="Web-{72A9CA45-1B51-36FB-7CDA-4C74B3F93E4F}" dt="2019-09-20T05:31:00.197" v="1"/>
-        <pc:sldMkLst>
-          <pc:docMk/>
-          <pc:sldMk cId="3216906863" sldId="2076136687"/>
-        </pc:sldMkLst>
-      </pc:sldChg>
-    </pc:docChg>
-  </pc:docChgLst>
-  <pc:docChgLst>
-    <pc:chgData name="David Coulter" userId="bd7f51f3-86ab-4183-af7c-70e0e78624e3" providerId="ADAL" clId="{25D832D8-7F7B-4D7D-A4D9-663A9C52B598}"/>
-    <pc:docChg chg="custSel modSld">
-      <pc:chgData name="David Coulter" userId="bd7f51f3-86ab-4183-af7c-70e0e78624e3" providerId="ADAL" clId="{25D832D8-7F7B-4D7D-A4D9-663A9C52B598}" dt="2019-09-23T15:31:59.244" v="18" actId="1589"/>
-      <pc:docMkLst>
-        <pc:docMk/>
-      </pc:docMkLst>
-      <pc:sldChg chg="addCm modCm">
-        <pc:chgData name="David Coulter" userId="bd7f51f3-86ab-4183-af7c-70e0e78624e3" providerId="ADAL" clId="{25D832D8-7F7B-4D7D-A4D9-663A9C52B598}" dt="2019-09-23T04:35:13.628" v="14" actId="1589"/>
-        <pc:sldMkLst>
-          <pc:docMk/>
-          <pc:sldMk cId="141977664" sldId="2076136639"/>
-        </pc:sldMkLst>
-      </pc:sldChg>
-      <pc:sldChg chg="addCm modCm">
-        <pc:chgData name="David Coulter" userId="bd7f51f3-86ab-4183-af7c-70e0e78624e3" providerId="ADAL" clId="{25D832D8-7F7B-4D7D-A4D9-663A9C52B598}" dt="2019-09-23T04:40:10.967" v="17" actId="2056"/>
-        <pc:sldMkLst>
-          <pc:docMk/>
-          <pc:sldMk cId="3600052600" sldId="2076136640"/>
-        </pc:sldMkLst>
-      </pc:sldChg>
-      <pc:sldChg chg="addCm modCm">
-        <pc:chgData name="David Coulter" userId="bd7f51f3-86ab-4183-af7c-70e0e78624e3" providerId="ADAL" clId="{25D832D8-7F7B-4D7D-A4D9-663A9C52B598}" dt="2019-09-23T15:31:59.244" v="18" actId="1589"/>
-        <pc:sldMkLst>
-          <pc:docMk/>
-          <pc:sldMk cId="2045845977" sldId="2076136653"/>
-        </pc:sldMkLst>
-      </pc:sldChg>
-      <pc:sldChg chg="modSp mod">
-        <pc:chgData name="David Coulter" userId="bd7f51f3-86ab-4183-af7c-70e0e78624e3" providerId="ADAL" clId="{25D832D8-7F7B-4D7D-A4D9-663A9C52B598}" dt="2019-09-22T16:59:27.402" v="10" actId="20577"/>
-        <pc:sldMkLst>
-          <pc:docMk/>
-          <pc:sldMk cId="2400275843" sldId="2076136681"/>
-        </pc:sldMkLst>
-        <pc:spChg chg="mod">
-          <ac:chgData name="David Coulter" userId="bd7f51f3-86ab-4183-af7c-70e0e78624e3" providerId="ADAL" clId="{25D832D8-7F7B-4D7D-A4D9-663A9C52B598}" dt="2019-09-22T16:59:27.402" v="10" actId="20577"/>
+        <pc:spChg chg="add mod">
+          <ac:chgData name="Wayne Meyer" userId="S::wayneme@microsoft.com::505e5828-32a7-4b23-b483-86ab7e4f6d84" providerId="AD" clId="Web-{593F3947-FF3C-5F86-C4C7-0864FF8E9CDF}" dt="2019-09-20T13:30:43.171" v="32" actId="20577"/>
           <ac:spMkLst>
             <pc:docMk/>
-            <pc:sldMk cId="2400275843" sldId="2076136681"/>
-            <ac:spMk id="3" creationId="{44CBCD13-CA19-4BFA-BCE8-529AB9F3F9B3}"/>
+            <pc:sldMk cId="3600052600" sldId="2076136640"/>
+            <ac:spMk id="11" creationId="{7B3F2D36-B35E-4B6A-B837-C0ACF97D6ED5}"/>
           </ac:spMkLst>
         </pc:spChg>
       </pc:sldChg>
-      <pc:sldChg chg="addCm modCm">
-        <pc:chgData name="David Coulter" userId="bd7f51f3-86ab-4183-af7c-70e0e78624e3" providerId="ADAL" clId="{25D832D8-7F7B-4D7D-A4D9-663A9C52B598}" dt="2019-09-22T16:52:54.803" v="2" actId="2056"/>
-        <pc:sldMkLst>
-          <pc:docMk/>
-          <pc:sldMk cId="3216906863" sldId="2076136687"/>
-        </pc:sldMkLst>
-      </pc:sldChg>
-    </pc:docChg>
-  </pc:docChgLst>
-  <pc:docChgLst>
-    <pc:chgData name="Conrad Sidey" userId="S::conrads@microsoft.com::8e7e4c1e-0b9f-408a-a744-9ab8b54b3853" providerId="AD" clId="Web-{CCD6F64E-952F-19B9-0A27-47DBD2AABF4B}"/>
-    <pc:docChg chg="">
-      <pc:chgData name="Conrad Sidey" userId="S::conrads@microsoft.com::8e7e4c1e-0b9f-408a-a744-9ab8b54b3853" providerId="AD" clId="Web-{CCD6F64E-952F-19B9-0A27-47DBD2AABF4B}" dt="2019-09-20T06:55:41.073" v="0"/>
-      <pc:docMkLst>
-        <pc:docMk/>
-      </pc:docMkLst>
       <pc:sldChg chg="addCm">
-        <pc:chgData name="Conrad Sidey" userId="S::conrads@microsoft.com::8e7e4c1e-0b9f-408a-a744-9ab8b54b3853" providerId="AD" clId="Web-{CCD6F64E-952F-19B9-0A27-47DBD2AABF4B}" dt="2019-09-20T06:55:41.073" v="0"/>
-        <pc:sldMkLst>
-          <pc:docMk/>
-          <pc:sldMk cId="2206074536" sldId="1999"/>
-        </pc:sldMkLst>
-      </pc:sldChg>
-    </pc:docChg>
-  </pc:docChgLst>
-  <pc:docChgLst>
-    <pc:chgData name="James Complin" userId="S::jacompli@microsoft.com::04684b05-a571-42a8-b582-bdb318c64b6d" providerId="AD" clId="Web-{9CB0BFD4-FEC2-8CF2-4C10-4C7CBFAFF638}"/>
-    <pc:docChg chg="">
-      <pc:chgData name="James Complin" userId="S::jacompli@microsoft.com::04684b05-a571-42a8-b582-bdb318c64b6d" providerId="AD" clId="Web-{9CB0BFD4-FEC2-8CF2-4C10-4C7CBFAFF638}" dt="2019-09-20T20:33:27.980" v="1"/>
-      <pc:docMkLst>
-        <pc:docMk/>
-      </pc:docMkLst>
-      <pc:sldChg chg="addCm">
-        <pc:chgData name="James Complin" userId="S::jacompli@microsoft.com::04684b05-a571-42a8-b582-bdb318c64b6d" providerId="AD" clId="Web-{9CB0BFD4-FEC2-8CF2-4C10-4C7CBFAFF638}" dt="2019-09-20T20:33:27.980" v="1"/>
-        <pc:sldMkLst>
-          <pc:docMk/>
-          <pc:sldMk cId="1359849352" sldId="10557"/>
-        </pc:sldMkLst>
-      </pc:sldChg>
-      <pc:sldChg chg="addCm">
-        <pc:chgData name="James Complin" userId="S::jacompli@microsoft.com::04684b05-a571-42a8-b582-bdb318c64b6d" providerId="AD" clId="Web-{9CB0BFD4-FEC2-8CF2-4C10-4C7CBFAFF638}" dt="2019-09-20T20:30:55.762" v="0"/>
+        <pc:chgData name="Wayne Meyer" userId="S::wayneme@microsoft.com::505e5828-32a7-4b23-b483-86ab7e4f6d84" providerId="AD" clId="Web-{593F3947-FF3C-5F86-C4C7-0864FF8E9CDF}" dt="2019-09-20T13:31:49.108" v="33"/>
         <pc:sldMkLst>
           <pc:docMk/>
           <pc:sldMk cId="1779733599" sldId="2076136657"/>
         </pc:sldMkLst>
       </pc:sldChg>
-    </pc:docChg>
-  </pc:docChgLst>
-  <pc:docChgLst>
-    <pc:chgData name="Lorand Farkas" userId="6dd8c035-74a1-41f1-bcf4-8d01c12b1819" providerId="ADAL" clId="{0403F691-11D7-E549-B47E-F2649B2B3781}"/>
-    <pc:docChg chg="modSld">
-      <pc:chgData name="Lorand Farkas" userId="6dd8c035-74a1-41f1-bcf4-8d01c12b1819" providerId="ADAL" clId="{0403F691-11D7-E549-B47E-F2649B2B3781}" dt="2019-10-08T19:23:03.923" v="0" actId="1076"/>
-      <pc:docMkLst>
-        <pc:docMk/>
-      </pc:docMkLst>
-      <pc:sldChg chg="modSp">
-        <pc:chgData name="Lorand Farkas" userId="6dd8c035-74a1-41f1-bcf4-8d01c12b1819" providerId="ADAL" clId="{0403F691-11D7-E549-B47E-F2649B2B3781}" dt="2019-10-08T19:23:03.923" v="0" actId="1076"/>
-        <pc:sldMkLst>
-          <pc:docMk/>
-          <pc:sldMk cId="141977664" sldId="2076136639"/>
-        </pc:sldMkLst>
-        <pc:spChg chg="mod">
-          <ac:chgData name="Lorand Farkas" userId="6dd8c035-74a1-41f1-bcf4-8d01c12b1819" providerId="ADAL" clId="{0403F691-11D7-E549-B47E-F2649B2B3781}" dt="2019-10-08T19:23:03.923" v="0" actId="1076"/>
-          <ac:spMkLst>
-            <pc:docMk/>
-            <pc:sldMk cId="141977664" sldId="2076136639"/>
-            <ac:spMk id="8" creationId="{4E2D9699-B376-479B-BAF2-880A1A0D0335}"/>
-          </ac:spMkLst>
-        </pc:spChg>
-      </pc:sldChg>
-    </pc:docChg>
-  </pc:docChgLst>
-  <pc:docChgLst>
-    <pc:chgData name="Janet Thomas" userId="08421ffd-879b-47f6-8d7f-61067c13bd1e" providerId="ADAL" clId="{32BA6DE9-A52C-4CD4-95BA-DA4899EA0E66}"/>
-    <pc:docChg chg="">
-      <pc:chgData name="Janet Thomas" userId="08421ffd-879b-47f6-8d7f-61067c13bd1e" providerId="ADAL" clId="{32BA6DE9-A52C-4CD4-95BA-DA4899EA0E66}" dt="2019-09-17T16:39:48.421" v="0" actId="5900"/>
-      <pc:docMkLst>
-        <pc:docMk/>
-      </pc:docMkLst>
-      <pc:sldChg chg="modCm">
-        <pc:chgData name="Janet Thomas" userId="08421ffd-879b-47f6-8d7f-61067c13bd1e" providerId="ADAL" clId="{32BA6DE9-A52C-4CD4-95BA-DA4899EA0E66}" dt="2019-09-17T16:39:48.421" v="0" actId="5900"/>
-        <pc:sldMkLst>
-          <pc:docMk/>
-          <pc:sldMk cId="3803056413" sldId="2076136638"/>
-        </pc:sldMkLst>
-      </pc:sldChg>
-    </pc:docChg>
-  </pc:docChgLst>
-  <pc:docChgLst>
-    <pc:chgData name="Janet Thomas" userId="08421ffd-879b-47f6-8d7f-61067c13bd1e" providerId="ADAL" clId="{E1C964E4-6D26-4EBA-B07F-DB51A2804AD0}"/>
-    <pc:docChg chg="modSld">
-      <pc:chgData name="Janet Thomas" userId="08421ffd-879b-47f6-8d7f-61067c13bd1e" providerId="ADAL" clId="{E1C964E4-6D26-4EBA-B07F-DB51A2804AD0}" dt="2019-09-30T20:37:57.049" v="0"/>
-      <pc:docMkLst>
-        <pc:docMk/>
-      </pc:docMkLst>
-    </pc:docChg>
-  </pc:docChgLst>
-  <pc:docChgLst>
-    <pc:chgData name="Ansley Yeo" userId="S::ansyeo@microsoft.com::0d040379-8e93-4226-9271-d416b2176717" providerId="AD" clId="Web-{D40DB876-651A-A59F-FB3A-183FEF4FCFF6}"/>
-    <pc:docChg chg="">
-      <pc:chgData name="Ansley Yeo" userId="S::ansyeo@microsoft.com::0d040379-8e93-4226-9271-d416b2176717" providerId="AD" clId="Web-{D40DB876-651A-A59F-FB3A-183FEF4FCFF6}" dt="2019-09-25T11:36:18.460" v="7"/>
-      <pc:docMkLst>
-        <pc:docMk/>
-      </pc:docMkLst>
       <pc:sldChg chg="addCm">
-        <pc:chgData name="Ansley Yeo" userId="S::ansyeo@microsoft.com::0d040379-8e93-4226-9271-d416b2176717" providerId="AD" clId="Web-{D40DB876-651A-A59F-FB3A-183FEF4FCFF6}" dt="2019-09-25T11:26:59.153" v="3"/>
-        <pc:sldMkLst>
-          <pc:docMk/>
-          <pc:sldMk cId="2045845977" sldId="2076136653"/>
-        </pc:sldMkLst>
-      </pc:sldChg>
-      <pc:sldChg chg="modCm">
-        <pc:chgData name="Ansley Yeo" userId="S::ansyeo@microsoft.com::0d040379-8e93-4226-9271-d416b2176717" providerId="AD" clId="Web-{D40DB876-651A-A59F-FB3A-183FEF4FCFF6}" dt="2019-09-25T08:19:55.584" v="2"/>
-        <pc:sldMkLst>
-          <pc:docMk/>
-          <pc:sldMk cId="2400275843" sldId="2076136681"/>
-        </pc:sldMkLst>
-      </pc:sldChg>
-      <pc:sldChg chg="addCm modCm">
-        <pc:chgData name="Ansley Yeo" userId="S::ansyeo@microsoft.com::0d040379-8e93-4226-9271-d416b2176717" providerId="AD" clId="Web-{D40DB876-651A-A59F-FB3A-183FEF4FCFF6}" dt="2019-09-25T11:36:18.460" v="7"/>
-        <pc:sldMkLst>
-          <pc:docMk/>
-          <pc:sldMk cId="2252954663" sldId="2076136684"/>
-        </pc:sldMkLst>
-      </pc:sldChg>
-    </pc:docChg>
-  </pc:docChgLst>
-  <pc:docChgLst>
-    <pc:chgData name="Lee Schuenemeyer" userId="290c3e3b-c057-42fa-bdb3-0cc8072667de" providerId="ADAL" clId="{BF6E392C-870B-4BA3-84D6-4C88F9873242}"/>
-    <pc:docChg chg="">
-      <pc:chgData name="Lee Schuenemeyer" userId="290c3e3b-c057-42fa-bdb3-0cc8072667de" providerId="ADAL" clId="{BF6E392C-870B-4BA3-84D6-4C88F9873242}" dt="2019-09-25T17:24:38.611" v="3" actId="2056"/>
-      <pc:docMkLst>
-        <pc:docMk/>
-      </pc:docMkLst>
-      <pc:sldChg chg="modCm">
-        <pc:chgData name="Lee Schuenemeyer" userId="290c3e3b-c057-42fa-bdb3-0cc8072667de" providerId="ADAL" clId="{BF6E392C-870B-4BA3-84D6-4C88F9873242}" dt="2019-09-25T17:24:38.611" v="3" actId="2056"/>
+        <pc:chgData name="Wayne Meyer" userId="S::wayneme@microsoft.com::505e5828-32a7-4b23-b483-86ab7e4f6d84" providerId="AD" clId="Web-{593F3947-FF3C-5F86-C4C7-0864FF8E9CDF}" dt="2019-09-20T13:29:37.092" v="0"/>
         <pc:sldMkLst>
           <pc:docMk/>
           <pc:sldMk cId="3216906863" sldId="2076136687"/>
@@ -1778,7 +1778,7 @@
           <a:p>
             <a:fld id="{295BC766-E5BA-40F8-9F5F-937F32F5E837}" type="datetimeFigureOut">
               <a:rPr lang="en-US" smtClean="0"/>
-              <a:t>10/8/19</a:t>
+              <a:t>11/17/2019</a:t>
             </a:fld>
             <a:endParaRPr lang="en-US"/>
           </a:p>
@@ -2266,7 +2266,7 @@
                 <a:tabLst/>
                 <a:defRPr/>
               </a:pPr>
-              <a:t>10/8/19 9:22 PM</a:t>
+              <a:t>11/17/2019 10:22 PM</a:t>
             </a:fld>
             <a:endParaRPr kumimoji="0" lang="en-US" sz="1200" b="0" i="0" u="none" strike="noStrike" kern="1200" cap="none" spc="0" normalizeH="0" baseline="0" noProof="0">
               <a:ln>
@@ -2602,7 +2602,7 @@
                 <a:tabLst/>
                 <a:defRPr/>
               </a:pPr>
-              <a:t>10/8/19 9:22 PM</a:t>
+              <a:t>11/17/2019 10:22 PM</a:t>
             </a:fld>
             <a:endParaRPr kumimoji="0" lang="en-US" sz="1200" b="0" i="0" u="none" strike="noStrike" kern="1200" cap="none" spc="0" normalizeH="0" baseline="0" noProof="0">
               <a:ln>
@@ -2761,7 +2761,7 @@
           <a:bodyPr/>
           <a:lstStyle/>
           <a:p>
-            <a:endParaRPr lang="en-US"/>
+            <a:endParaRPr lang="en-US" dirty="0"/>
           </a:p>
         </p:txBody>
       </p:sp>
@@ -3190,7 +3190,7 @@
                 <a:tabLst/>
                 <a:defRPr/>
               </a:pPr>
-              <a:t>10/8/19 9:22 PM</a:t>
+              <a:t>11/17/2019 10:22 PM</a:t>
             </a:fld>
             <a:endParaRPr kumimoji="0" lang="en-US" sz="1200" b="0" i="0" u="none" strike="noStrike" kern="1200" cap="none" spc="0" normalizeH="0" baseline="0" noProof="0">
               <a:ln>
@@ -3452,7 +3452,7 @@
           <a:p>
             <a:fld id="{B8F212EF-2DB5-4B5E-9054-0A301D6C4C73}" type="datetimeFigureOut">
               <a:rPr lang="en-US" smtClean="0"/>
-              <a:t>10/8/19</a:t>
+              <a:t>11/17/2019</a:t>
             </a:fld>
             <a:endParaRPr lang="en-US"/>
           </a:p>
@@ -3650,7 +3650,7 @@
           <a:p>
             <a:fld id="{B8F212EF-2DB5-4B5E-9054-0A301D6C4C73}" type="datetimeFigureOut">
               <a:rPr lang="en-US" smtClean="0"/>
-              <a:t>10/8/19</a:t>
+              <a:t>11/17/2019</a:t>
             </a:fld>
             <a:endParaRPr lang="en-US"/>
           </a:p>
@@ -3858,7 +3858,7 @@
           <a:p>
             <a:fld id="{B8F212EF-2DB5-4B5E-9054-0A301D6C4C73}" type="datetimeFigureOut">
               <a:rPr lang="en-US" smtClean="0"/>
-              <a:t>10/8/19</a:t>
+              <a:t>11/17/2019</a:t>
             </a:fld>
             <a:endParaRPr lang="en-US"/>
           </a:p>
@@ -7417,7 +7417,7 @@
           <a:p>
             <a:fld id="{B8F212EF-2DB5-4B5E-9054-0A301D6C4C73}" type="datetimeFigureOut">
               <a:rPr lang="en-US" smtClean="0"/>
-              <a:t>10/8/19</a:t>
+              <a:t>11/17/2019</a:t>
             </a:fld>
             <a:endParaRPr lang="en-US"/>
           </a:p>
@@ -10439,7 +10439,7 @@
           <a:p>
             <a:fld id="{B8F212EF-2DB5-4B5E-9054-0A301D6C4C73}" type="datetimeFigureOut">
               <a:rPr lang="en-US" smtClean="0"/>
-              <a:t>10/8/19</a:t>
+              <a:t>11/17/2019</a:t>
             </a:fld>
             <a:endParaRPr lang="en-US"/>
           </a:p>
@@ -12544,7 +12544,7 @@
           <a:p>
             <a:fld id="{B8F212EF-2DB5-4B5E-9054-0A301D6C4C73}" type="datetimeFigureOut">
               <a:rPr lang="en-US" smtClean="0"/>
-              <a:t>10/8/19</a:t>
+              <a:t>11/17/2019</a:t>
             </a:fld>
             <a:endParaRPr lang="en-US"/>
           </a:p>
@@ -13692,7 +13692,7 @@
           <a:p>
             <a:fld id="{B8F212EF-2DB5-4B5E-9054-0A301D6C4C73}" type="datetimeFigureOut">
               <a:rPr lang="en-US" smtClean="0"/>
-              <a:t>10/8/19</a:t>
+              <a:t>11/17/2019</a:t>
             </a:fld>
             <a:endParaRPr lang="en-US"/>
           </a:p>
@@ -13833,7 +13833,7 @@
           <a:p>
             <a:fld id="{B8F212EF-2DB5-4B5E-9054-0A301D6C4C73}" type="datetimeFigureOut">
               <a:rPr lang="en-US" smtClean="0"/>
-              <a:t>10/8/19</a:t>
+              <a:t>11/17/2019</a:t>
             </a:fld>
             <a:endParaRPr lang="en-US"/>
           </a:p>
@@ -13946,7 +13946,7 @@
           <a:p>
             <a:fld id="{B8F212EF-2DB5-4B5E-9054-0A301D6C4C73}" type="datetimeFigureOut">
               <a:rPr lang="en-US" smtClean="0"/>
-              <a:t>10/8/19</a:t>
+              <a:t>11/17/2019</a:t>
             </a:fld>
             <a:endParaRPr lang="en-US"/>
           </a:p>
@@ -14257,7 +14257,7 @@
           <a:p>
             <a:fld id="{B8F212EF-2DB5-4B5E-9054-0A301D6C4C73}" type="datetimeFigureOut">
               <a:rPr lang="en-US" smtClean="0"/>
-              <a:t>10/8/19</a:t>
+              <a:t>11/17/2019</a:t>
             </a:fld>
             <a:endParaRPr lang="en-US"/>
           </a:p>
@@ -14545,7 +14545,7 @@
           <a:p>
             <a:fld id="{B8F212EF-2DB5-4B5E-9054-0A301D6C4C73}" type="datetimeFigureOut">
               <a:rPr lang="en-US" smtClean="0"/>
-              <a:t>10/8/19</a:t>
+              <a:t>11/17/2019</a:t>
             </a:fld>
             <a:endParaRPr lang="en-US"/>
           </a:p>
@@ -14786,7 +14786,7 @@
           <a:p>
             <a:fld id="{B8F212EF-2DB5-4B5E-9054-0A301D6C4C73}" type="datetimeFigureOut">
               <a:rPr lang="en-US" smtClean="0"/>
-              <a:t>10/8/19</a:t>
+              <a:t>11/17/2019</a:t>
             </a:fld>
             <a:endParaRPr lang="en-US"/>
           </a:p>
@@ -19250,7 +19250,7 @@
         </p:nvSpPr>
         <p:spPr>
           <a:xfrm>
-            <a:off x="-755530" y="6547418"/>
+            <a:off x="1794032" y="6376488"/>
             <a:ext cx="8773477" cy="369332"/>
           </a:xfrm>
           <a:prstGeom prst="rect">
@@ -19264,25 +19264,25 @@
           <a:lstStyle/>
           <a:p>
             <a:r>
-              <a:rPr lang="en-US" i="1">
+              <a:rPr lang="en-US" i="1" dirty="0">
                 <a:latin typeface="Segoe UI "/>
               </a:rPr>
               <a:t>Use the </a:t>
             </a:r>
             <a:r>
-              <a:rPr lang="en-US" i="1">
+              <a:rPr lang="en-US" i="1" dirty="0">
                 <a:latin typeface="Segoe UI "/>
                 <a:hlinkClick r:id="rId5"/>
               </a:rPr>
               <a:t>business document template </a:t>
             </a:r>
             <a:r>
-              <a:rPr lang="en-US" i="1">
+              <a:rPr lang="en-US" i="1" dirty="0">
                 <a:latin typeface="Segoe UI "/>
               </a:rPr>
               <a:t>to identify your business outcomes</a:t>
             </a:r>
-            <a:endParaRPr lang="en-US"/>
+            <a:endParaRPr lang="en-US" dirty="0"/>
           </a:p>
         </p:txBody>
       </p:sp>
@@ -25375,7 +25375,7 @@
           <a:graphicData uri="http://schemas.openxmlformats.org/presentationml/2006/ole">
             <mc:AlternateContent xmlns:mc="http://schemas.openxmlformats.org/markup-compatibility/2006">
               <mc:Choice xmlns:v="urn:schemas-microsoft-com:vml" Requires="v">
-                <p:oleObj spid="_x0000_s1025" name="Bitmap Image" r:id="rId3" imgW="8963090" imgH="3662389" progId="Paint.Picture">
+                <p:oleObj spid="_x0000_s1027" name="Bitmap Image" r:id="rId3" imgW="8963090" imgH="3662389" progId="Paint.Picture">
                   <p:embed/>
                 </p:oleObj>
               </mc:Choice>
@@ -27046,7 +27046,7 @@
 </file>
 
 <file path=ppt/slides/slide33.xml><?xml version="1.0" encoding="utf-8"?>
-<p:sld xmlns:a="http://schemas.openxmlformats.org/drawingml/2006/main" xmlns:r="http://schemas.openxmlformats.org/officeDocument/2006/relationships" xmlns:p="http://schemas.openxmlformats.org/presentationml/2006/main" show="0">
+<p:sld xmlns:a="http://schemas.openxmlformats.org/drawingml/2006/main" xmlns:r="http://schemas.openxmlformats.org/officeDocument/2006/relationships" xmlns:p="http://schemas.openxmlformats.org/presentationml/2006/main">
   <p:cSld>
     <p:spTree>
       <p:nvGrpSpPr>
@@ -43694,18 +43694,12 @@
 </file>
 
 <file path=customXml/item1.xml><?xml version="1.0" encoding="utf-8"?>
-<p:properties xmlns:p="http://schemas.microsoft.com/office/2006/metadata/properties" xmlns:xsi="http://www.w3.org/2001/XMLSchema-instance" xmlns:pc="http://schemas.microsoft.com/office/infopath/2007/PartnerControls">
-  <documentManagement>
-    <SharedWithUsers xmlns="5d0a0686-a3c6-401e-8596-31c6446e2673">
-      <UserInfo>
-        <DisplayName>Calvin Drover</DisplayName>
-        <AccountId>193</AccountId>
-        <AccountType/>
-      </UserInfo>
-    </SharedWithUsers>
-    <MediaServiceKeyPoints xmlns="9f9f0ed7-b6e7-4e0d-9b4d-b4e73fb1e1ba" xsi:nil="true"/>
-  </documentManagement>
-</p:properties>
+<?mso-contentType ?>
+<FormTemplates xmlns="http://schemas.microsoft.com/sharepoint/v3/contenttype/forms">
+  <Display>DocumentLibraryForm</Display>
+  <Edit>DocumentLibraryForm</Edit>
+  <New>DocumentLibraryForm</New>
+</FormTemplates>
 </file>
 
 <file path=customXml/item2.xml><?xml version="1.0" encoding="utf-8"?>
@@ -43926,32 +43920,56 @@
 </file>
 
 <file path=customXml/item3.xml><?xml version="1.0" encoding="utf-8"?>
-<?mso-contentType ?>
-<FormTemplates xmlns="http://schemas.microsoft.com/sharepoint/v3/contenttype/forms">
-  <Display>DocumentLibraryForm</Display>
-  <Edit>DocumentLibraryForm</Edit>
-  <New>DocumentLibraryForm</New>
-</FormTemplates>
+<p:properties xmlns:p="http://schemas.microsoft.com/office/2006/metadata/properties" xmlns:xsi="http://www.w3.org/2001/XMLSchema-instance" xmlns:pc="http://schemas.microsoft.com/office/infopath/2007/PartnerControls">
+  <documentManagement>
+    <SharedWithUsers xmlns="5d0a0686-a3c6-401e-8596-31c6446e2673">
+      <UserInfo>
+        <DisplayName>Calvin Drover</DisplayName>
+        <AccountId>193</AccountId>
+        <AccountType/>
+      </UserInfo>
+    </SharedWithUsers>
+    <MediaServiceKeyPoints xmlns="9f9f0ed7-b6e7-4e0d-9b4d-b4e73fb1e1ba" xsi:nil="true"/>
+  </documentManagement>
+</p:properties>
 </file>
 
 <file path=customXml/itemProps1.xml><?xml version="1.0" encoding="utf-8"?>
+<ds:datastoreItem xmlns:ds="http://schemas.openxmlformats.org/officeDocument/2006/customXml" ds:itemID="{7B9985E7-F7C6-4958-AABD-0B7F8BC31F4D}">
+  <ds:schemaRefs>
+    <ds:schemaRef ds:uri="http://schemas.microsoft.com/sharepoint/v3/contenttype/forms"/>
+  </ds:schemaRefs>
+</ds:datastoreItem>
+</file>
+
+<file path=customXml/itemProps2.xml><?xml version="1.0" encoding="utf-8"?>
+<ds:datastoreItem xmlns:ds="http://schemas.openxmlformats.org/officeDocument/2006/customXml" ds:itemID="{7641848F-4641-433D-B2F8-DCE7FC22C672}">
+  <ds:schemaRefs>
+    <ds:schemaRef ds:uri="http://schemas.microsoft.com/office/2006/metadata/contentType"/>
+    <ds:schemaRef ds:uri="http://schemas.microsoft.com/office/2006/metadata/properties/metaAttributes"/>
+    <ds:schemaRef ds:uri="http://www.w3.org/2001/XMLSchema"/>
+    <ds:schemaRef ds:uri="http://schemas.microsoft.com/office/2006/metadata/properties"/>
+    <ds:schemaRef ds:uri="9f9f0ed7-b6e7-4e0d-9b4d-b4e73fb1e1ba"/>
+    <ds:schemaRef ds:uri="5d0a0686-a3c6-401e-8596-31c6446e2673"/>
+    <ds:schemaRef ds:uri="http://schemas.microsoft.com/office/2006/documentManagement/types"/>
+    <ds:schemaRef ds:uri="http://schemas.microsoft.com/office/infopath/2007/PartnerControls"/>
+    <ds:schemaRef ds:uri="http://schemas.openxmlformats.org/package/2006/metadata/core-properties"/>
+    <ds:schemaRef ds:uri="http://purl.org/dc/elements/1.1/"/>
+    <ds:schemaRef ds:uri="http://purl.org/dc/terms/"/>
+    <ds:schemaRef ds:uri="http://schemas.microsoft.com/internal/obd"/>
+  </ds:schemaRefs>
+</ds:datastoreItem>
+</file>
+
+<file path=customXml/itemProps3.xml><?xml version="1.0" encoding="utf-8"?>
 <ds:datastoreItem xmlns:ds="http://schemas.openxmlformats.org/officeDocument/2006/customXml" ds:itemID="{7D758C25-7188-4B86-83B4-902BBD715003}">
   <ds:schemaRefs>
     <ds:schemaRef ds:uri="http://schemas.microsoft.com/office/2006/metadata/properties"/>
     <ds:schemaRef ds:uri="http://www.w3.org/2000/xmlns/"/>
     <ds:schemaRef ds:uri="0d923eac-bfb4-4245-8744-7b25224dfe7c"/>
-  </ds:schemaRefs>
-</ds:datastoreItem>
-</file>
-
-<file path=customXml/itemProps2.xml><?xml version="1.0" encoding="utf-8"?>
-<ds:datastoreItem xmlns:ds="http://schemas.openxmlformats.org/officeDocument/2006/customXml" ds:itemID="{7641848F-4641-433D-B2F8-DCE7FC22C672}"/>
-</file>
-
-<file path=customXml/itemProps3.xml><?xml version="1.0" encoding="utf-8"?>
-<ds:datastoreItem xmlns:ds="http://schemas.openxmlformats.org/officeDocument/2006/customXml" ds:itemID="{7B9985E7-F7C6-4958-AABD-0B7F8BC31F4D}">
-  <ds:schemaRefs>
-    <ds:schemaRef ds:uri="http://schemas.microsoft.com/sharepoint/v3/contenttype/forms"/>
+    <ds:schemaRef ds:uri="http://schemas.microsoft.com/office/infopath/2007/PartnerControls"/>
+    <ds:schemaRef ds:uri="5d0a0686-a3c6-401e-8596-31c6446e2673"/>
+    <ds:schemaRef ds:uri="9f9f0ed7-b6e7-4e0d-9b4d-b4e73fb1e1ba"/>
   </ds:schemaRefs>
 </ds:datastoreItem>
 </file>
</xml_diff>

<commit_message>
Changes on the PPTs
</commit_message>
<xml_diff>
--- a/2_strategy/Cloud Adoption Framework - Strategy-Plan-Ready (L200).pptx
+++ b/2_strategy/Cloud Adoption Framework - Strategy-Plan-Ready (L200).pptx
@@ -286,17 +286,70 @@
 <file path=ppt/changesInfos/changesInfo1.xml><?xml version="1.0" encoding="utf-8"?>
 <pc:chgInfo xmlns:a="http://schemas.openxmlformats.org/drawingml/2006/main" xmlns:r="http://schemas.openxmlformats.org/officeDocument/2006/relationships" xmlns:ac="http://schemas.microsoft.com/office/drawing/2013/main/command" xmlns:pc="http://schemas.microsoft.com/office/powerpoint/2013/main/command">
   <pc:docChgLst>
-    <pc:chgData name="Conrad Sidey" userId="S::conrads@microsoft.com::8e7e4c1e-0b9f-408a-a744-9ab8b54b3853" providerId="AD" clId="Web-{CCD6F64E-952F-19B9-0A27-47DBD2AABF4B}"/>
+    <pc:chgData name="Julie Osburn" userId="S::juliejo@microsoft.com::b2aec404-568e-403a-b1a3-65f4a6e1880d" providerId="AD" clId="Web-{582D52EE-84D2-81B1-8E44-909045FA1117}"/>
     <pc:docChg chg="">
-      <pc:chgData name="Conrad Sidey" userId="S::conrads@microsoft.com::8e7e4c1e-0b9f-408a-a744-9ab8b54b3853" providerId="AD" clId="Web-{CCD6F64E-952F-19B9-0A27-47DBD2AABF4B}" dt="2019-09-20T06:55:41.073" v="0"/>
+      <pc:chgData name="Julie Osburn" userId="S::juliejo@microsoft.com::b2aec404-568e-403a-b1a3-65f4a6e1880d" providerId="AD" clId="Web-{582D52EE-84D2-81B1-8E44-909045FA1117}" dt="2019-09-23T17:37:33.914" v="0"/>
       <pc:docMkLst>
         <pc:docMk/>
       </pc:docMkLst>
       <pc:sldChg chg="addCm">
-        <pc:chgData name="Conrad Sidey" userId="S::conrads@microsoft.com::8e7e4c1e-0b9f-408a-a744-9ab8b54b3853" providerId="AD" clId="Web-{CCD6F64E-952F-19B9-0A27-47DBD2AABF4B}" dt="2019-09-20T06:55:41.073" v="0"/>
+        <pc:chgData name="Julie Osburn" userId="S::juliejo@microsoft.com::b2aec404-568e-403a-b1a3-65f4a6e1880d" providerId="AD" clId="Web-{582D52EE-84D2-81B1-8E44-909045FA1117}" dt="2019-09-23T17:37:33.914" v="0"/>
+        <pc:sldMkLst>
+          <pc:docMk/>
+          <pc:sldMk cId="3600052600" sldId="2076136640"/>
+        </pc:sldMkLst>
+      </pc:sldChg>
+    </pc:docChg>
+  </pc:docChgLst>
+  <pc:docChgLst>
+    <pc:chgData name="Wayne Meyer" userId="S::wayneme@microsoft.com::505e5828-32a7-4b23-b483-86ab7e4f6d84" providerId="AD" clId="Web-{593F3947-FF3C-5F86-C4C7-0864FF8E9CDF}"/>
+    <pc:docChg chg="modSld">
+      <pc:chgData name="Wayne Meyer" userId="S::wayneme@microsoft.com::505e5828-32a7-4b23-b483-86ab7e4f6d84" providerId="AD" clId="Web-{593F3947-FF3C-5F86-C4C7-0864FF8E9CDF}" dt="2019-09-20T13:32:49.456" v="71"/>
+      <pc:docMkLst>
+        <pc:docMk/>
+      </pc:docMkLst>
+      <pc:sldChg chg="modSp addCm">
+        <pc:chgData name="Wayne Meyer" userId="S::wayneme@microsoft.com::505e5828-32a7-4b23-b483-86ab7e4f6d84" providerId="AD" clId="Web-{593F3947-FF3C-5F86-C4C7-0864FF8E9CDF}" dt="2019-09-20T13:32:49.456" v="71"/>
         <pc:sldMkLst>
           <pc:docMk/>
           <pc:sldMk cId="2206074536" sldId="1999"/>
+        </pc:sldMkLst>
+        <pc:spChg chg="mod">
+          <ac:chgData name="Wayne Meyer" userId="S::wayneme@microsoft.com::505e5828-32a7-4b23-b483-86ab7e4f6d84" providerId="AD" clId="Web-{593F3947-FF3C-5F86-C4C7-0864FF8E9CDF}" dt="2019-09-20T13:32:22.189" v="68" actId="20577"/>
+          <ac:spMkLst>
+            <pc:docMk/>
+            <pc:sldMk cId="2206074536" sldId="1999"/>
+            <ac:spMk id="2" creationId="{00000000-0000-0000-0000-000000000000}"/>
+          </ac:spMkLst>
+        </pc:spChg>
+      </pc:sldChg>
+      <pc:sldChg chg="addSp modSp">
+        <pc:chgData name="Wayne Meyer" userId="S::wayneme@microsoft.com::505e5828-32a7-4b23-b483-86ab7e4f6d84" providerId="AD" clId="Web-{593F3947-FF3C-5F86-C4C7-0864FF8E9CDF}" dt="2019-09-20T13:30:43.171" v="32" actId="20577"/>
+        <pc:sldMkLst>
+          <pc:docMk/>
+          <pc:sldMk cId="3600052600" sldId="2076136640"/>
+        </pc:sldMkLst>
+        <pc:spChg chg="add mod">
+          <ac:chgData name="Wayne Meyer" userId="S::wayneme@microsoft.com::505e5828-32a7-4b23-b483-86ab7e4f6d84" providerId="AD" clId="Web-{593F3947-FF3C-5F86-C4C7-0864FF8E9CDF}" dt="2019-09-20T13:30:43.171" v="32" actId="20577"/>
+          <ac:spMkLst>
+            <pc:docMk/>
+            <pc:sldMk cId="3600052600" sldId="2076136640"/>
+            <ac:spMk id="11" creationId="{7B3F2D36-B35E-4B6A-B837-C0ACF97D6ED5}"/>
+          </ac:spMkLst>
+        </pc:spChg>
+      </pc:sldChg>
+      <pc:sldChg chg="addCm">
+        <pc:chgData name="Wayne Meyer" userId="S::wayneme@microsoft.com::505e5828-32a7-4b23-b483-86ab7e4f6d84" providerId="AD" clId="Web-{593F3947-FF3C-5F86-C4C7-0864FF8E9CDF}" dt="2019-09-20T13:31:49.108" v="33"/>
+        <pc:sldMkLst>
+          <pc:docMk/>
+          <pc:sldMk cId="1779733599" sldId="2076136657"/>
+        </pc:sldMkLst>
+      </pc:sldChg>
+      <pc:sldChg chg="addCm">
+        <pc:chgData name="Wayne Meyer" userId="S::wayneme@microsoft.com::505e5828-32a7-4b23-b483-86ab7e4f6d84" providerId="AD" clId="Web-{593F3947-FF3C-5F86-C4C7-0864FF8E9CDF}" dt="2019-09-20T13:29:37.092" v="0"/>
+        <pc:sldMkLst>
+          <pc:docMk/>
+          <pc:sldMk cId="3216906863" sldId="2076136687"/>
         </pc:sldMkLst>
       </pc:sldChg>
     </pc:docChg>
@@ -318,56 +371,478 @@
     </pc:docChg>
   </pc:docChgLst>
   <pc:docChgLst>
-    <pc:chgData name="Janet Thomas" userId="08421ffd-879b-47f6-8d7f-61067c13bd1e" providerId="ADAL" clId="{32BA6DE9-A52C-4CD4-95BA-DA4899EA0E66}"/>
+    <pc:chgData name="Johan Grant" userId="S::jogrant@microsoft.com::4c19665d-e4ad-4a0a-a05e-a1053f6c6b5c" providerId="AD" clId="Web-{BC6688CD-D7BA-155E-1F59-9A2F9762427F}"/>
     <pc:docChg chg="">
-      <pc:chgData name="Janet Thomas" userId="08421ffd-879b-47f6-8d7f-61067c13bd1e" providerId="ADAL" clId="{32BA6DE9-A52C-4CD4-95BA-DA4899EA0E66}" dt="2019-09-17T16:39:48.421" v="0" actId="5900"/>
+      <pc:chgData name="Johan Grant" userId="S::jogrant@microsoft.com::4c19665d-e4ad-4a0a-a05e-a1053f6c6b5c" providerId="AD" clId="Web-{BC6688CD-D7BA-155E-1F59-9A2F9762427F}" dt="2019-09-23T03:10:30.651" v="14"/>
       <pc:docMkLst>
         <pc:docMk/>
       </pc:docMkLst>
-      <pc:sldChg chg="modCm">
-        <pc:chgData name="Janet Thomas" userId="08421ffd-879b-47f6-8d7f-61067c13bd1e" providerId="ADAL" clId="{32BA6DE9-A52C-4CD4-95BA-DA4899EA0E66}" dt="2019-09-17T16:39:48.421" v="0" actId="5900"/>
+      <pc:sldChg chg="addCm">
+        <pc:chgData name="Johan Grant" userId="S::jogrant@microsoft.com::4c19665d-e4ad-4a0a-a05e-a1053f6c6b5c" providerId="AD" clId="Web-{BC6688CD-D7BA-155E-1F59-9A2F9762427F}" dt="2019-09-23T01:43:37.205" v="5"/>
+        <pc:sldMkLst>
+          <pc:docMk/>
+          <pc:sldMk cId="837477126" sldId="2076136632"/>
+        </pc:sldMkLst>
+      </pc:sldChg>
+      <pc:sldChg chg="addCm">
+        <pc:chgData name="Johan Grant" userId="S::jogrant@microsoft.com::4c19665d-e4ad-4a0a-a05e-a1053f6c6b5c" providerId="AD" clId="Web-{BC6688CD-D7BA-155E-1F59-9A2F9762427F}" dt="2019-09-23T01:37:26.761" v="2"/>
+        <pc:sldMkLst>
+          <pc:docMk/>
+          <pc:sldMk cId="3600052600" sldId="2076136640"/>
+        </pc:sldMkLst>
+      </pc:sldChg>
+      <pc:sldChg chg="addCm delCm modCm">
+        <pc:chgData name="Johan Grant" userId="S::jogrant@microsoft.com::4c19665d-e4ad-4a0a-a05e-a1053f6c6b5c" providerId="AD" clId="Web-{BC6688CD-D7BA-155E-1F59-9A2F9762427F}" dt="2019-09-23T01:49:31.092" v="10"/>
+        <pc:sldMkLst>
+          <pc:docMk/>
+          <pc:sldMk cId="3373473442" sldId="2076136642"/>
+        </pc:sldMkLst>
+      </pc:sldChg>
+      <pc:sldChg chg="addCm">
+        <pc:chgData name="Johan Grant" userId="S::jogrant@microsoft.com::4c19665d-e4ad-4a0a-a05e-a1053f6c6b5c" providerId="AD" clId="Web-{BC6688CD-D7BA-155E-1F59-9A2F9762427F}" dt="2019-09-23T01:50:15.281" v="11"/>
+        <pc:sldMkLst>
+          <pc:docMk/>
+          <pc:sldMk cId="1352040138" sldId="2076136648"/>
+        </pc:sldMkLst>
+      </pc:sldChg>
+      <pc:sldChg chg="addCm modCm">
+        <pc:chgData name="Johan Grant" userId="S::jogrant@microsoft.com::4c19665d-e4ad-4a0a-a05e-a1053f6c6b5c" providerId="AD" clId="Web-{BC6688CD-D7BA-155E-1F59-9A2F9762427F}" dt="2019-09-23T03:09:48.479" v="13"/>
+        <pc:sldMkLst>
+          <pc:docMk/>
+          <pc:sldMk cId="3675644745" sldId="2076136651"/>
+        </pc:sldMkLst>
+      </pc:sldChg>
+      <pc:sldChg chg="addCm">
+        <pc:chgData name="Johan Grant" userId="S::jogrant@microsoft.com::4c19665d-e4ad-4a0a-a05e-a1053f6c6b5c" providerId="AD" clId="Web-{BC6688CD-D7BA-155E-1F59-9A2F9762427F}" dt="2019-09-23T03:10:30.651" v="14"/>
+        <pc:sldMkLst>
+          <pc:docMk/>
+          <pc:sldMk cId="2045845977" sldId="2076136653"/>
+        </pc:sldMkLst>
+      </pc:sldChg>
+      <pc:sldChg chg="addCm">
+        <pc:chgData name="Johan Grant" userId="S::jogrant@microsoft.com::4c19665d-e4ad-4a0a-a05e-a1053f6c6b5c" providerId="AD" clId="Web-{BC6688CD-D7BA-155E-1F59-9A2F9762427F}" dt="2019-09-23T01:40:00.516" v="3"/>
+        <pc:sldMkLst>
+          <pc:docMk/>
+          <pc:sldMk cId="2792427332" sldId="2076136654"/>
+        </pc:sldMkLst>
+      </pc:sldChg>
+      <pc:sldChg chg="addCm">
+        <pc:chgData name="Johan Grant" userId="S::jogrant@microsoft.com::4c19665d-e4ad-4a0a-a05e-a1053f6c6b5c" providerId="AD" clId="Web-{BC6688CD-D7BA-155E-1F59-9A2F9762427F}" dt="2019-09-23T01:41:38.830" v="4"/>
+        <pc:sldMkLst>
+          <pc:docMk/>
+          <pc:sldMk cId="2400275843" sldId="2076136681"/>
+        </pc:sldMkLst>
+      </pc:sldChg>
+    </pc:docChg>
+  </pc:docChgLst>
+  <pc:docChgLst>
+    <pc:chgData name="Wayne Meyer" userId="505e5828-32a7-4b23-b483-86ab7e4f6d84" providerId="ADAL" clId="{732092DD-500E-4ABF-849B-CDC879E857EB}"/>
+    <pc:docChg chg="undo custSel addSld modSld sldOrd addSection">
+      <pc:chgData name="Wayne Meyer" userId="505e5828-32a7-4b23-b483-86ab7e4f6d84" providerId="ADAL" clId="{732092DD-500E-4ABF-849B-CDC879E857EB}" dt="2019-10-04T19:34:53.569" v="4910" actId="20577"/>
+      <pc:docMkLst>
+        <pc:docMk/>
+      </pc:docMkLst>
+      <pc:sldChg chg="addCm modCm">
+        <pc:chgData name="Wayne Meyer" userId="505e5828-32a7-4b23-b483-86ab7e4f6d84" providerId="ADAL" clId="{732092DD-500E-4ABF-849B-CDC879E857EB}" dt="2019-09-20T20:31:28.015" v="2864"/>
+        <pc:sldMkLst>
+          <pc:docMk/>
+          <pc:sldMk cId="2206074536" sldId="1999"/>
+        </pc:sldMkLst>
+      </pc:sldChg>
+      <pc:sldChg chg="addCm modCm">
+        <pc:chgData name="Wayne Meyer" userId="505e5828-32a7-4b23-b483-86ab7e4f6d84" providerId="ADAL" clId="{732092DD-500E-4ABF-849B-CDC879E857EB}" dt="2019-09-16T20:54:09.044" v="216"/>
+        <pc:sldMkLst>
+          <pc:docMk/>
+          <pc:sldMk cId="1359849352" sldId="10557"/>
+        </pc:sldMkLst>
+      </pc:sldChg>
+      <pc:sldChg chg="ord">
+        <pc:chgData name="Wayne Meyer" userId="505e5828-32a7-4b23-b483-86ab7e4f6d84" providerId="ADAL" clId="{732092DD-500E-4ABF-849B-CDC879E857EB}" dt="2019-09-17T19:03:07.138" v="2352"/>
+        <pc:sldMkLst>
+          <pc:docMk/>
+          <pc:sldMk cId="2749409799" sldId="2076136631"/>
+        </pc:sldMkLst>
+      </pc:sldChg>
+      <pc:sldChg chg="addCm modCm">
+        <pc:chgData name="Wayne Meyer" userId="505e5828-32a7-4b23-b483-86ab7e4f6d84" providerId="ADAL" clId="{732092DD-500E-4ABF-849B-CDC879E857EB}" dt="2019-09-16T21:05:32.097" v="220"/>
         <pc:sldMkLst>
           <pc:docMk/>
           <pc:sldMk cId="3803056413" sldId="2076136638"/>
         </pc:sldMkLst>
       </pc:sldChg>
-    </pc:docChg>
-  </pc:docChgLst>
-  <pc:docChgLst>
-    <pc:chgData name="Julie Osburn" userId="S::juliejo@microsoft.com::b2aec404-568e-403a-b1a3-65f4a6e1880d" providerId="AD" clId="Web-{582D52EE-84D2-81B1-8E44-909045FA1117}"/>
-    <pc:docChg chg="">
-      <pc:chgData name="Julie Osburn" userId="S::juliejo@microsoft.com::b2aec404-568e-403a-b1a3-65f4a6e1880d" providerId="AD" clId="Web-{582D52EE-84D2-81B1-8E44-909045FA1117}" dt="2019-09-23T17:37:33.914" v="0"/>
-      <pc:docMkLst>
-        <pc:docMk/>
-      </pc:docMkLst>
       <pc:sldChg chg="addCm">
-        <pc:chgData name="Julie Osburn" userId="S::juliejo@microsoft.com::b2aec404-568e-403a-b1a3-65f4a6e1880d" providerId="AD" clId="Web-{582D52EE-84D2-81B1-8E44-909045FA1117}" dt="2019-09-23T17:37:33.914" v="0"/>
+        <pc:chgData name="Wayne Meyer" userId="505e5828-32a7-4b23-b483-86ab7e4f6d84" providerId="ADAL" clId="{732092DD-500E-4ABF-849B-CDC879E857EB}" dt="2019-09-23T19:25:28.625" v="3201" actId="1589"/>
         <pc:sldMkLst>
           <pc:docMk/>
           <pc:sldMk cId="3600052600" sldId="2076136640"/>
         </pc:sldMkLst>
       </pc:sldChg>
+      <pc:sldChg chg="modSp addCm">
+        <pc:chgData name="Wayne Meyer" userId="505e5828-32a7-4b23-b483-86ab7e4f6d84" providerId="ADAL" clId="{732092DD-500E-4ABF-849B-CDC879E857EB}" dt="2019-09-23T16:52:53.436" v="3197" actId="20577"/>
+        <pc:sldMkLst>
+          <pc:docMk/>
+          <pc:sldMk cId="3373473442" sldId="2076136642"/>
+        </pc:sldMkLst>
+        <pc:spChg chg="mod">
+          <ac:chgData name="Wayne Meyer" userId="505e5828-32a7-4b23-b483-86ab7e4f6d84" providerId="ADAL" clId="{732092DD-500E-4ABF-849B-CDC879E857EB}" dt="2019-09-23T16:52:53.436" v="3197" actId="20577"/>
+          <ac:spMkLst>
+            <pc:docMk/>
+            <pc:sldMk cId="3373473442" sldId="2076136642"/>
+            <ac:spMk id="4" creationId="{D0F4117A-D87C-4A68-8091-434B0BB4D79E}"/>
+          </ac:spMkLst>
+        </pc:spChg>
+      </pc:sldChg>
+      <pc:sldChg chg="addCm">
+        <pc:chgData name="Wayne Meyer" userId="505e5828-32a7-4b23-b483-86ab7e4f6d84" providerId="ADAL" clId="{732092DD-500E-4ABF-849B-CDC879E857EB}" dt="2019-09-23T16:50:02.624" v="3076" actId="1589"/>
+        <pc:sldMkLst>
+          <pc:docMk/>
+          <pc:sldMk cId="1352040138" sldId="2076136648"/>
+        </pc:sldMkLst>
+      </pc:sldChg>
+      <pc:sldChg chg="addCm modCm">
+        <pc:chgData name="Wayne Meyer" userId="505e5828-32a7-4b23-b483-86ab7e4f6d84" providerId="ADAL" clId="{732092DD-500E-4ABF-849B-CDC879E857EB}" dt="2019-09-16T20:57:54.838" v="218"/>
+        <pc:sldMkLst>
+          <pc:docMk/>
+          <pc:sldMk cId="2792427332" sldId="2076136654"/>
+        </pc:sldMkLst>
+      </pc:sldChg>
+      <pc:sldChg chg="addCm modCm">
+        <pc:chgData name="Wayne Meyer" userId="505e5828-32a7-4b23-b483-86ab7e4f6d84" providerId="ADAL" clId="{732092DD-500E-4ABF-849B-CDC879E857EB}" dt="2019-09-24T18:51:50.320" v="4585" actId="1589"/>
+        <pc:sldMkLst>
+          <pc:docMk/>
+          <pc:sldMk cId="1779733599" sldId="2076136657"/>
+        </pc:sldMkLst>
+      </pc:sldChg>
+      <pc:sldChg chg="addCm delCm">
+        <pc:chgData name="Wayne Meyer" userId="505e5828-32a7-4b23-b483-86ab7e4f6d84" providerId="ADAL" clId="{732092DD-500E-4ABF-849B-CDC879E857EB}" dt="2019-09-23T17:25:08.438" v="3200" actId="1592"/>
+        <pc:sldMkLst>
+          <pc:docMk/>
+          <pc:sldMk cId="3689659425" sldId="2076136658"/>
+        </pc:sldMkLst>
+      </pc:sldChg>
+      <pc:sldChg chg="addSp modSp addCm modCm">
+        <pc:chgData name="Wayne Meyer" userId="505e5828-32a7-4b23-b483-86ab7e4f6d84" providerId="ADAL" clId="{732092DD-500E-4ABF-849B-CDC879E857EB}" dt="2019-09-24T18:46:36.441" v="4584" actId="1076"/>
+        <pc:sldMkLst>
+          <pc:docMk/>
+          <pc:sldMk cId="2400275843" sldId="2076136681"/>
+        </pc:sldMkLst>
+        <pc:spChg chg="mod">
+          <ac:chgData name="Wayne Meyer" userId="505e5828-32a7-4b23-b483-86ab7e4f6d84" providerId="ADAL" clId="{732092DD-500E-4ABF-849B-CDC879E857EB}" dt="2019-09-16T21:07:30.567" v="223" actId="1076"/>
+          <ac:spMkLst>
+            <pc:docMk/>
+            <pc:sldMk cId="2400275843" sldId="2076136681"/>
+            <ac:spMk id="2" creationId="{BBB84D00-5465-4D6C-8B5A-46D1308CEA53}"/>
+          </ac:spMkLst>
+        </pc:spChg>
+        <pc:spChg chg="add mod">
+          <ac:chgData name="Wayne Meyer" userId="505e5828-32a7-4b23-b483-86ab7e4f6d84" providerId="ADAL" clId="{732092DD-500E-4ABF-849B-CDC879E857EB}" dt="2019-09-24T18:46:36.441" v="4584" actId="1076"/>
+          <ac:spMkLst>
+            <pc:docMk/>
+            <pc:sldMk cId="2400275843" sldId="2076136681"/>
+            <ac:spMk id="3" creationId="{44CBCD13-CA19-4BFA-BCE8-529AB9F3F9B3}"/>
+          </ac:spMkLst>
+        </pc:spChg>
+      </pc:sldChg>
+      <pc:sldChg chg="addSp modSp addCm modCm">
+        <pc:chgData name="Wayne Meyer" userId="505e5828-32a7-4b23-b483-86ab7e4f6d84" providerId="ADAL" clId="{732092DD-500E-4ABF-849B-CDC879E857EB}" dt="2019-09-25T17:14:37.491" v="4589"/>
+        <pc:sldMkLst>
+          <pc:docMk/>
+          <pc:sldMk cId="4085166417" sldId="2076136682"/>
+        </pc:sldMkLst>
+        <pc:spChg chg="mod">
+          <ac:chgData name="Wayne Meyer" userId="505e5828-32a7-4b23-b483-86ab7e4f6d84" providerId="ADAL" clId="{732092DD-500E-4ABF-849B-CDC879E857EB}" dt="2019-09-17T03:15:45.409" v="884" actId="1076"/>
+          <ac:spMkLst>
+            <pc:docMk/>
+            <pc:sldMk cId="4085166417" sldId="2076136682"/>
+            <ac:spMk id="2" creationId="{BBB84D00-5465-4D6C-8B5A-46D1308CEA53}"/>
+          </ac:spMkLst>
+        </pc:spChg>
+        <pc:spChg chg="add mod">
+          <ac:chgData name="Wayne Meyer" userId="505e5828-32a7-4b23-b483-86ab7e4f6d84" providerId="ADAL" clId="{732092DD-500E-4ABF-849B-CDC879E857EB}" dt="2019-09-17T15:02:29.381" v="1508" actId="1076"/>
+          <ac:spMkLst>
+            <pc:docMk/>
+            <pc:sldMk cId="4085166417" sldId="2076136682"/>
+            <ac:spMk id="3" creationId="{56116777-CBC1-4CBD-B255-FDDB899FFC61}"/>
+          </ac:spMkLst>
+        </pc:spChg>
+      </pc:sldChg>
+      <pc:sldChg chg="addSp modSp">
+        <pc:chgData name="Wayne Meyer" userId="505e5828-32a7-4b23-b483-86ab7e4f6d84" providerId="ADAL" clId="{732092DD-500E-4ABF-849B-CDC879E857EB}" dt="2019-10-04T19:33:18.749" v="4687" actId="20577"/>
+        <pc:sldMkLst>
+          <pc:docMk/>
+          <pc:sldMk cId="2252954663" sldId="2076136684"/>
+        </pc:sldMkLst>
+        <pc:spChg chg="mod">
+          <ac:chgData name="Wayne Meyer" userId="505e5828-32a7-4b23-b483-86ab7e4f6d84" providerId="ADAL" clId="{732092DD-500E-4ABF-849B-CDC879E857EB}" dt="2019-09-17T15:06:04.655" v="1509" actId="1076"/>
+          <ac:spMkLst>
+            <pc:docMk/>
+            <pc:sldMk cId="2252954663" sldId="2076136684"/>
+            <ac:spMk id="2" creationId="{BBB84D00-5465-4D6C-8B5A-46D1308CEA53}"/>
+          </ac:spMkLst>
+        </pc:spChg>
+        <pc:spChg chg="add mod">
+          <ac:chgData name="Wayne Meyer" userId="505e5828-32a7-4b23-b483-86ab7e4f6d84" providerId="ADAL" clId="{732092DD-500E-4ABF-849B-CDC879E857EB}" dt="2019-10-04T19:33:18.749" v="4687" actId="20577"/>
+          <ac:spMkLst>
+            <pc:docMk/>
+            <pc:sldMk cId="2252954663" sldId="2076136684"/>
+            <ac:spMk id="3" creationId="{6D28BB17-D855-423C-AF7E-755A194CBFF8}"/>
+          </ac:spMkLst>
+        </pc:spChg>
+      </pc:sldChg>
+      <pc:sldChg chg="addSp delSp modSp add modTransition addCm modCm">
+        <pc:chgData name="Wayne Meyer" userId="505e5828-32a7-4b23-b483-86ab7e4f6d84" providerId="ADAL" clId="{732092DD-500E-4ABF-849B-CDC879E857EB}" dt="2019-09-24T18:44:41.197" v="4583" actId="20577"/>
+        <pc:sldMkLst>
+          <pc:docMk/>
+          <pc:sldMk cId="2140864898" sldId="2076136686"/>
+        </pc:sldMkLst>
+        <pc:spChg chg="del">
+          <ac:chgData name="Wayne Meyer" userId="505e5828-32a7-4b23-b483-86ab7e4f6d84" providerId="ADAL" clId="{732092DD-500E-4ABF-849B-CDC879E857EB}" dt="2019-09-16T20:51:37.541" v="3"/>
+          <ac:spMkLst>
+            <pc:docMk/>
+            <pc:sldMk cId="2140864898" sldId="2076136686"/>
+            <ac:spMk id="2" creationId="{CCFD2B24-E7E2-4A89-8D65-3A5F5E4A3DC0}"/>
+          </ac:spMkLst>
+        </pc:spChg>
+        <pc:spChg chg="add mod">
+          <ac:chgData name="Wayne Meyer" userId="505e5828-32a7-4b23-b483-86ab7e4f6d84" providerId="ADAL" clId="{732092DD-500E-4ABF-849B-CDC879E857EB}" dt="2019-09-24T18:44:32.352" v="4553" actId="1076"/>
+          <ac:spMkLst>
+            <pc:docMk/>
+            <pc:sldMk cId="2140864898" sldId="2076136686"/>
+            <ac:spMk id="3" creationId="{92BDBA25-825B-4BB4-8E7F-8D0B2ED6A83E}"/>
+          </ac:spMkLst>
+        </pc:spChg>
+        <pc:spChg chg="add mod">
+          <ac:chgData name="Wayne Meyer" userId="505e5828-32a7-4b23-b483-86ab7e4f6d84" providerId="ADAL" clId="{732092DD-500E-4ABF-849B-CDC879E857EB}" dt="2019-09-17T19:40:41.445" v="2862" actId="20577"/>
+          <ac:spMkLst>
+            <pc:docMk/>
+            <pc:sldMk cId="2140864898" sldId="2076136686"/>
+            <ac:spMk id="4" creationId="{25873FDE-079D-4A37-A390-AB5EB17171C1}"/>
+          </ac:spMkLst>
+        </pc:spChg>
+        <pc:spChg chg="add mod">
+          <ac:chgData name="Wayne Meyer" userId="505e5828-32a7-4b23-b483-86ab7e4f6d84" providerId="ADAL" clId="{732092DD-500E-4ABF-849B-CDC879E857EB}" dt="2019-09-24T18:44:41.197" v="4583" actId="20577"/>
+          <ac:spMkLst>
+            <pc:docMk/>
+            <pc:sldMk cId="2140864898" sldId="2076136686"/>
+            <ac:spMk id="5" creationId="{0DC01527-1153-41F3-81EF-3C67D8DB7BE6}"/>
+          </ac:spMkLst>
+        </pc:spChg>
+      </pc:sldChg>
+      <pc:sldChg chg="addSp modSp add">
+        <pc:chgData name="Wayne Meyer" userId="505e5828-32a7-4b23-b483-86ab7e4f6d84" providerId="ADAL" clId="{732092DD-500E-4ABF-849B-CDC879E857EB}" dt="2019-09-20T20:32:26.531" v="2889" actId="20577"/>
+        <pc:sldMkLst>
+          <pc:docMk/>
+          <pc:sldMk cId="3216906863" sldId="2076136687"/>
+        </pc:sldMkLst>
+        <pc:spChg chg="mod">
+          <ac:chgData name="Wayne Meyer" userId="505e5828-32a7-4b23-b483-86ab7e4f6d84" providerId="ADAL" clId="{732092DD-500E-4ABF-849B-CDC879E857EB}" dt="2019-09-17T16:20:31.226" v="1883" actId="20577"/>
+          <ac:spMkLst>
+            <pc:docMk/>
+            <pc:sldMk cId="3216906863" sldId="2076136687"/>
+            <ac:spMk id="2" creationId="{0F1AFFC0-512C-40E5-8EB0-B3D8B34ED10E}"/>
+          </ac:spMkLst>
+        </pc:spChg>
+        <pc:spChg chg="add mod">
+          <ac:chgData name="Wayne Meyer" userId="505e5828-32a7-4b23-b483-86ab7e4f6d84" providerId="ADAL" clId="{732092DD-500E-4ABF-849B-CDC879E857EB}" dt="2019-09-17T19:14:17.195" v="2363" actId="1076"/>
+          <ac:spMkLst>
+            <pc:docMk/>
+            <pc:sldMk cId="3216906863" sldId="2076136687"/>
+            <ac:spMk id="3" creationId="{A3358EA3-C175-4114-8A10-1E536C6FFC0F}"/>
+          </ac:spMkLst>
+        </pc:spChg>
+        <pc:spChg chg="add mod">
+          <ac:chgData name="Wayne Meyer" userId="505e5828-32a7-4b23-b483-86ab7e4f6d84" providerId="ADAL" clId="{732092DD-500E-4ABF-849B-CDC879E857EB}" dt="2019-09-17T16:21:30.075" v="2017" actId="1076"/>
+          <ac:spMkLst>
+            <pc:docMk/>
+            <pc:sldMk cId="3216906863" sldId="2076136687"/>
+            <ac:spMk id="4" creationId="{D455950F-8144-4598-932F-C94B38450D43}"/>
+          </ac:spMkLst>
+        </pc:spChg>
+        <pc:spChg chg="add mod">
+          <ac:chgData name="Wayne Meyer" userId="505e5828-32a7-4b23-b483-86ab7e4f6d84" providerId="ADAL" clId="{732092DD-500E-4ABF-849B-CDC879E857EB}" dt="2019-09-20T20:32:26.531" v="2889" actId="20577"/>
+          <ac:spMkLst>
+            <pc:docMk/>
+            <pc:sldMk cId="3216906863" sldId="2076136687"/>
+            <ac:spMk id="6" creationId="{A5ED6BEB-CA71-4A3C-8C29-B27FA8B24764}"/>
+          </ac:spMkLst>
+        </pc:spChg>
+        <pc:picChg chg="add mod modCrop">
+          <ac:chgData name="Wayne Meyer" userId="505e5828-32a7-4b23-b483-86ab7e4f6d84" providerId="ADAL" clId="{732092DD-500E-4ABF-849B-CDC879E857EB}" dt="2019-09-17T19:14:29.261" v="2366" actId="1076"/>
+          <ac:picMkLst>
+            <pc:docMk/>
+            <pc:sldMk cId="3216906863" sldId="2076136687"/>
+            <ac:picMk id="5" creationId="{E013CE12-34D4-4328-9FE1-2FA4FFEF5E0F}"/>
+          </ac:picMkLst>
+        </pc:picChg>
+      </pc:sldChg>
+      <pc:sldChg chg="addSp modSp add">
+        <pc:chgData name="Wayne Meyer" userId="505e5828-32a7-4b23-b483-86ab7e4f6d84" providerId="ADAL" clId="{732092DD-500E-4ABF-849B-CDC879E857EB}" dt="2019-10-04T19:34:53.569" v="4910" actId="20577"/>
+        <pc:sldMkLst>
+          <pc:docMk/>
+          <pc:sldMk cId="161631102" sldId="2076136688"/>
+        </pc:sldMkLst>
+        <pc:spChg chg="mod">
+          <ac:chgData name="Wayne Meyer" userId="505e5828-32a7-4b23-b483-86ab7e4f6d84" providerId="ADAL" clId="{732092DD-500E-4ABF-849B-CDC879E857EB}" dt="2019-09-17T16:21:57.166" v="2028" actId="20577"/>
+          <ac:spMkLst>
+            <pc:docMk/>
+            <pc:sldMk cId="161631102" sldId="2076136688"/>
+            <ac:spMk id="2" creationId="{5D71C1A6-45E5-4F07-9EF4-8FD285FE66D7}"/>
+          </ac:spMkLst>
+        </pc:spChg>
+        <pc:spChg chg="add mod">
+          <ac:chgData name="Wayne Meyer" userId="505e5828-32a7-4b23-b483-86ab7e4f6d84" providerId="ADAL" clId="{732092DD-500E-4ABF-849B-CDC879E857EB}" dt="2019-10-04T19:34:53.569" v="4910" actId="20577"/>
+          <ac:spMkLst>
+            <pc:docMk/>
+            <pc:sldMk cId="161631102" sldId="2076136688"/>
+            <ac:spMk id="3" creationId="{05A126BA-131A-4F54-8EB4-5FCCF9009BB9}"/>
+          </ac:spMkLst>
+        </pc:spChg>
+      </pc:sldChg>
+      <pc:sldChg chg="addSp delSp modSp add">
+        <pc:chgData name="Wayne Meyer" userId="505e5828-32a7-4b23-b483-86ab7e4f6d84" providerId="ADAL" clId="{732092DD-500E-4ABF-849B-CDC879E857EB}" dt="2019-09-17T19:25:29.340" v="2780" actId="20577"/>
+        <pc:sldMkLst>
+          <pc:docMk/>
+          <pc:sldMk cId="1179338870" sldId="2076136689"/>
+        </pc:sldMkLst>
+        <pc:spChg chg="del">
+          <ac:chgData name="Wayne Meyer" userId="505e5828-32a7-4b23-b483-86ab7e4f6d84" providerId="ADAL" clId="{732092DD-500E-4ABF-849B-CDC879E857EB}" dt="2019-09-17T19:20:48.322" v="2368"/>
+          <ac:spMkLst>
+            <pc:docMk/>
+            <pc:sldMk cId="1179338870" sldId="2076136689"/>
+            <ac:spMk id="2" creationId="{57F9FA68-E135-4C84-B881-E5B2D70238B9}"/>
+          </ac:spMkLst>
+        </pc:spChg>
+        <pc:spChg chg="del">
+          <ac:chgData name="Wayne Meyer" userId="505e5828-32a7-4b23-b483-86ab7e4f6d84" providerId="ADAL" clId="{732092DD-500E-4ABF-849B-CDC879E857EB}" dt="2019-09-17T19:20:48.322" v="2368"/>
+          <ac:spMkLst>
+            <pc:docMk/>
+            <pc:sldMk cId="1179338870" sldId="2076136689"/>
+            <ac:spMk id="3" creationId="{46FD7A56-DD0C-4B60-87D5-A3E77E95162D}"/>
+          </ac:spMkLst>
+        </pc:spChg>
+        <pc:spChg chg="del">
+          <ac:chgData name="Wayne Meyer" userId="505e5828-32a7-4b23-b483-86ab7e4f6d84" providerId="ADAL" clId="{732092DD-500E-4ABF-849B-CDC879E857EB}" dt="2019-09-17T19:20:48.322" v="2368"/>
+          <ac:spMkLst>
+            <pc:docMk/>
+            <pc:sldMk cId="1179338870" sldId="2076136689"/>
+            <ac:spMk id="4" creationId="{1341805B-CE13-4264-8ACF-C82710FF546F}"/>
+          </ac:spMkLst>
+        </pc:spChg>
+        <pc:spChg chg="add mod">
+          <ac:chgData name="Wayne Meyer" userId="505e5828-32a7-4b23-b483-86ab7e4f6d84" providerId="ADAL" clId="{732092DD-500E-4ABF-849B-CDC879E857EB}" dt="2019-09-17T19:20:55.937" v="2394" actId="20577"/>
+          <ac:spMkLst>
+            <pc:docMk/>
+            <pc:sldMk cId="1179338870" sldId="2076136689"/>
+            <ac:spMk id="5" creationId="{6B9D8A96-53EB-4BDA-90A6-F5FB0DBF2131}"/>
+          </ac:spMkLst>
+        </pc:spChg>
+        <pc:spChg chg="add mod">
+          <ac:chgData name="Wayne Meyer" userId="505e5828-32a7-4b23-b483-86ab7e4f6d84" providerId="ADAL" clId="{732092DD-500E-4ABF-849B-CDC879E857EB}" dt="2019-09-17T19:25:29.340" v="2780" actId="20577"/>
+          <ac:spMkLst>
+            <pc:docMk/>
+            <pc:sldMk cId="1179338870" sldId="2076136689"/>
+            <ac:spMk id="6" creationId="{528A090E-4917-427D-8C02-38274B925CA2}"/>
+          </ac:spMkLst>
+        </pc:spChg>
+      </pc:sldChg>
+      <pc:sldChg chg="addSp modSp add modTransition">
+        <pc:chgData name="Wayne Meyer" userId="505e5828-32a7-4b23-b483-86ab7e4f6d84" providerId="ADAL" clId="{732092DD-500E-4ABF-849B-CDC879E857EB}" dt="2019-09-24T18:41:52.641" v="4430" actId="404"/>
+        <pc:sldMkLst>
+          <pc:docMk/>
+          <pc:sldMk cId="3112863487" sldId="2076136691"/>
+        </pc:sldMkLst>
+        <pc:spChg chg="mod">
+          <ac:chgData name="Wayne Meyer" userId="505e5828-32a7-4b23-b483-86ab7e4f6d84" providerId="ADAL" clId="{732092DD-500E-4ABF-849B-CDC879E857EB}" dt="2019-09-24T18:30:12.913" v="3658" actId="1076"/>
+          <ac:spMkLst>
+            <pc:docMk/>
+            <pc:sldMk cId="3112863487" sldId="2076136691"/>
+            <ac:spMk id="2" creationId="{D1C6060C-4A01-4A69-99E3-F37D20F69C89}"/>
+          </ac:spMkLst>
+        </pc:spChg>
+        <pc:spChg chg="mod">
+          <ac:chgData name="Wayne Meyer" userId="505e5828-32a7-4b23-b483-86ab7e4f6d84" providerId="ADAL" clId="{732092DD-500E-4ABF-849B-CDC879E857EB}" dt="2019-09-24T18:41:52.641" v="4430" actId="404"/>
+          <ac:spMkLst>
+            <pc:docMk/>
+            <pc:sldMk cId="3112863487" sldId="2076136691"/>
+            <ac:spMk id="3" creationId="{0E5F9931-64E2-4AB3-81DA-C1E7D926DCC3}"/>
+          </ac:spMkLst>
+        </pc:spChg>
+        <pc:spChg chg="add mod">
+          <ac:chgData name="Wayne Meyer" userId="505e5828-32a7-4b23-b483-86ab7e4f6d84" providerId="ADAL" clId="{732092DD-500E-4ABF-849B-CDC879E857EB}" dt="2019-09-24T18:28:00.330" v="3404" actId="1076"/>
+          <ac:spMkLst>
+            <pc:docMk/>
+            <pc:sldMk cId="3112863487" sldId="2076136691"/>
+            <ac:spMk id="5" creationId="{4D05DA9D-7D40-4BBB-8B4B-9748AC5EC3CA}"/>
+          </ac:spMkLst>
+        </pc:spChg>
+        <pc:spChg chg="add mod">
+          <ac:chgData name="Wayne Meyer" userId="505e5828-32a7-4b23-b483-86ab7e4f6d84" providerId="ADAL" clId="{732092DD-500E-4ABF-849B-CDC879E857EB}" dt="2019-09-24T18:34:11.002" v="3933" actId="1076"/>
+          <ac:spMkLst>
+            <pc:docMk/>
+            <pc:sldMk cId="3112863487" sldId="2076136691"/>
+            <ac:spMk id="6" creationId="{D79416E0-7232-4686-8906-83ED9D7D29B1}"/>
+          </ac:spMkLst>
+        </pc:spChg>
+        <pc:spChg chg="add mod">
+          <ac:chgData name="Wayne Meyer" userId="505e5828-32a7-4b23-b483-86ab7e4f6d84" providerId="ADAL" clId="{732092DD-500E-4ABF-849B-CDC879E857EB}" dt="2019-09-24T18:41:42.659" v="4429" actId="20577"/>
+          <ac:spMkLst>
+            <pc:docMk/>
+            <pc:sldMk cId="3112863487" sldId="2076136691"/>
+            <ac:spMk id="7" creationId="{EA0B07BB-4C8D-43F4-A71C-AA01CF5124E3}"/>
+          </ac:spMkLst>
+        </pc:spChg>
+      </pc:sldChg>
     </pc:docChg>
   </pc:docChgLst>
   <pc:docChgLst>
-    <pc:chgData name="James Complin" userId="S::jacompli@microsoft.com::04684b05-a571-42a8-b582-bdb318c64b6d" providerId="AD" clId="Web-{9CB0BFD4-FEC2-8CF2-4C10-4C7CBFAFF638}"/>
+    <pc:chgData name="Conrad Sidey" userId="S::conrads@microsoft.com::8e7e4c1e-0b9f-408a-a744-9ab8b54b3853" providerId="AD" clId="Web-{CCD6F64E-952F-19B9-0A27-47DBD2AABF4B}"/>
     <pc:docChg chg="">
-      <pc:chgData name="James Complin" userId="S::jacompli@microsoft.com::04684b05-a571-42a8-b582-bdb318c64b6d" providerId="AD" clId="Web-{9CB0BFD4-FEC2-8CF2-4C10-4C7CBFAFF638}" dt="2019-09-20T20:33:27.980" v="1"/>
+      <pc:chgData name="Conrad Sidey" userId="S::conrads@microsoft.com::8e7e4c1e-0b9f-408a-a744-9ab8b54b3853" providerId="AD" clId="Web-{CCD6F64E-952F-19B9-0A27-47DBD2AABF4B}" dt="2019-09-20T06:55:41.073" v="0"/>
       <pc:docMkLst>
         <pc:docMk/>
       </pc:docMkLst>
       <pc:sldChg chg="addCm">
-        <pc:chgData name="James Complin" userId="S::jacompli@microsoft.com::04684b05-a571-42a8-b582-bdb318c64b6d" providerId="AD" clId="Web-{9CB0BFD4-FEC2-8CF2-4C10-4C7CBFAFF638}" dt="2019-09-20T20:33:27.980" v="1"/>
+        <pc:chgData name="Conrad Sidey" userId="S::conrads@microsoft.com::8e7e4c1e-0b9f-408a-a744-9ab8b54b3853" providerId="AD" clId="Web-{CCD6F64E-952F-19B9-0A27-47DBD2AABF4B}" dt="2019-09-20T06:55:41.073" v="0"/>
         <pc:sldMkLst>
           <pc:docMk/>
-          <pc:sldMk cId="1359849352" sldId="10557"/>
+          <pc:sldMk cId="2206074536" sldId="1999"/>
+        </pc:sldMkLst>
+      </pc:sldChg>
+    </pc:docChg>
+  </pc:docChgLst>
+  <pc:docChgLst>
+    <pc:chgData name="Julie Osburn" userId="S::juliejo@microsoft.com::b2aec404-568e-403a-b1a3-65f4a6e1880d" providerId="AD" clId="Web-{21B278C0-D68F-10B5-13D5-2C6E5F12EBA8}"/>
+    <pc:docChg chg="">
+      <pc:chgData name="Julie Osburn" userId="S::juliejo@microsoft.com::b2aec404-568e-403a-b1a3-65f4a6e1880d" providerId="AD" clId="Web-{21B278C0-D68F-10B5-13D5-2C6E5F12EBA8}" dt="2019-09-23T16:21:14.958" v="4"/>
+      <pc:docMkLst>
+        <pc:docMk/>
+      </pc:docMkLst>
+      <pc:sldChg chg="addCm">
+        <pc:chgData name="Julie Osburn" userId="S::juliejo@microsoft.com::b2aec404-568e-403a-b1a3-65f4a6e1880d" providerId="AD" clId="Web-{21B278C0-D68F-10B5-13D5-2C6E5F12EBA8}" dt="2019-09-23T16:16:49.957" v="2"/>
+        <pc:sldMkLst>
+          <pc:docMk/>
+          <pc:sldMk cId="141977664" sldId="2076136639"/>
         </pc:sldMkLst>
       </pc:sldChg>
       <pc:sldChg chg="addCm">
-        <pc:chgData name="James Complin" userId="S::jacompli@microsoft.com::04684b05-a571-42a8-b582-bdb318c64b6d" providerId="AD" clId="Web-{9CB0BFD4-FEC2-8CF2-4C10-4C7CBFAFF638}" dt="2019-09-20T20:30:55.762" v="0"/>
+        <pc:chgData name="Julie Osburn" userId="S::juliejo@microsoft.com::b2aec404-568e-403a-b1a3-65f4a6e1880d" providerId="AD" clId="Web-{21B278C0-D68F-10B5-13D5-2C6E5F12EBA8}" dt="2019-09-23T16:18:56.520" v="3"/>
         <pc:sldMkLst>
           <pc:docMk/>
-          <pc:sldMk cId="1779733599" sldId="2076136657"/>
+          <pc:sldMk cId="3600052600" sldId="2076136640"/>
+        </pc:sldMkLst>
+      </pc:sldChg>
+      <pc:sldChg chg="addCm">
+        <pc:chgData name="Julie Osburn" userId="S::juliejo@microsoft.com::b2aec404-568e-403a-b1a3-65f4a6e1880d" providerId="AD" clId="Web-{21B278C0-D68F-10B5-13D5-2C6E5F12EBA8}" dt="2019-09-23T16:21:14.958" v="4"/>
+        <pc:sldMkLst>
+          <pc:docMk/>
+          <pc:sldMk cId="3689659425" sldId="2076136658"/>
+        </pc:sldMkLst>
+      </pc:sldChg>
+      <pc:sldChg chg="addCm modCm">
+        <pc:chgData name="Julie Osburn" userId="S::juliejo@microsoft.com::b2aec404-568e-403a-b1a3-65f4a6e1880d" providerId="AD" clId="Web-{21B278C0-D68F-10B5-13D5-2C6E5F12EBA8}" dt="2019-09-23T16:12:07.738" v="1"/>
+        <pc:sldMkLst>
+          <pc:docMk/>
+          <pc:sldMk cId="2140864898" sldId="2076136686"/>
         </pc:sldMkLst>
       </pc:sldChg>
     </pc:docChg>
@@ -425,6 +900,29 @@
     </pc:docChg>
   </pc:docChgLst>
   <pc:docChgLst>
+    <pc:chgData name="James Complin" userId="S::jacompli@microsoft.com::04684b05-a571-42a8-b582-bdb318c64b6d" providerId="AD" clId="Web-{9CB0BFD4-FEC2-8CF2-4C10-4C7CBFAFF638}"/>
+    <pc:docChg chg="">
+      <pc:chgData name="James Complin" userId="S::jacompli@microsoft.com::04684b05-a571-42a8-b582-bdb318c64b6d" providerId="AD" clId="Web-{9CB0BFD4-FEC2-8CF2-4C10-4C7CBFAFF638}" dt="2019-09-20T20:33:27.980" v="1"/>
+      <pc:docMkLst>
+        <pc:docMk/>
+      </pc:docMkLst>
+      <pc:sldChg chg="addCm">
+        <pc:chgData name="James Complin" userId="S::jacompli@microsoft.com::04684b05-a571-42a8-b582-bdb318c64b6d" providerId="AD" clId="Web-{9CB0BFD4-FEC2-8CF2-4C10-4C7CBFAFF638}" dt="2019-09-20T20:33:27.980" v="1"/>
+        <pc:sldMkLst>
+          <pc:docMk/>
+          <pc:sldMk cId="1359849352" sldId="10557"/>
+        </pc:sldMkLst>
+      </pc:sldChg>
+      <pc:sldChg chg="addCm">
+        <pc:chgData name="James Complin" userId="S::jacompli@microsoft.com::04684b05-a571-42a8-b582-bdb318c64b6d" providerId="AD" clId="Web-{9CB0BFD4-FEC2-8CF2-4C10-4C7CBFAFF638}" dt="2019-09-20T20:30:55.762" v="0"/>
+        <pc:sldMkLst>
+          <pc:docMk/>
+          <pc:sldMk cId="1779733599" sldId="2076136657"/>
+        </pc:sldMkLst>
+      </pc:sldChg>
+    </pc:docChg>
+  </pc:docChgLst>
+  <pc:docChgLst>
     <pc:chgData name="Ansley Yeo" userId="S::ansyeo@microsoft.com::0d040379-8e93-4226-9271-d416b2176717" providerId="AD" clId="Web-{296ABE3E-8085-56A1-43D1-49CDF14E653A}"/>
     <pc:docChg chg="">
       <pc:chgData name="Ansley Yeo" userId="S::ansyeo@microsoft.com::0d040379-8e93-4226-9271-d416b2176717" providerId="AD" clId="Web-{296ABE3E-8085-56A1-43D1-49CDF14E653A}" dt="2019-09-24T09:38:39.884" v="4"/>
@@ -452,52 +950,6 @@
           <pc:sldMk cId="2400275843" sldId="2076136681"/>
         </pc:sldMkLst>
       </pc:sldChg>
-    </pc:docChg>
-  </pc:docChgLst>
-  <pc:docChgLst>
-    <pc:chgData name="Julie Osburn" userId="S::juliejo@microsoft.com::b2aec404-568e-403a-b1a3-65f4a6e1880d" providerId="AD" clId="Web-{21B278C0-D68F-10B5-13D5-2C6E5F12EBA8}"/>
-    <pc:docChg chg="">
-      <pc:chgData name="Julie Osburn" userId="S::juliejo@microsoft.com::b2aec404-568e-403a-b1a3-65f4a6e1880d" providerId="AD" clId="Web-{21B278C0-D68F-10B5-13D5-2C6E5F12EBA8}" dt="2019-09-23T16:21:14.958" v="4"/>
-      <pc:docMkLst>
-        <pc:docMk/>
-      </pc:docMkLst>
-      <pc:sldChg chg="addCm">
-        <pc:chgData name="Julie Osburn" userId="S::juliejo@microsoft.com::b2aec404-568e-403a-b1a3-65f4a6e1880d" providerId="AD" clId="Web-{21B278C0-D68F-10B5-13D5-2C6E5F12EBA8}" dt="2019-09-23T16:16:49.957" v="2"/>
-        <pc:sldMkLst>
-          <pc:docMk/>
-          <pc:sldMk cId="141977664" sldId="2076136639"/>
-        </pc:sldMkLst>
-      </pc:sldChg>
-      <pc:sldChg chg="addCm">
-        <pc:chgData name="Julie Osburn" userId="S::juliejo@microsoft.com::b2aec404-568e-403a-b1a3-65f4a6e1880d" providerId="AD" clId="Web-{21B278C0-D68F-10B5-13D5-2C6E5F12EBA8}" dt="2019-09-23T16:18:56.520" v="3"/>
-        <pc:sldMkLst>
-          <pc:docMk/>
-          <pc:sldMk cId="3600052600" sldId="2076136640"/>
-        </pc:sldMkLst>
-      </pc:sldChg>
-      <pc:sldChg chg="addCm">
-        <pc:chgData name="Julie Osburn" userId="S::juliejo@microsoft.com::b2aec404-568e-403a-b1a3-65f4a6e1880d" providerId="AD" clId="Web-{21B278C0-D68F-10B5-13D5-2C6E5F12EBA8}" dt="2019-09-23T16:21:14.958" v="4"/>
-        <pc:sldMkLst>
-          <pc:docMk/>
-          <pc:sldMk cId="3689659425" sldId="2076136658"/>
-        </pc:sldMkLst>
-      </pc:sldChg>
-      <pc:sldChg chg="addCm modCm">
-        <pc:chgData name="Julie Osburn" userId="S::juliejo@microsoft.com::b2aec404-568e-403a-b1a3-65f4a6e1880d" providerId="AD" clId="Web-{21B278C0-D68F-10B5-13D5-2C6E5F12EBA8}" dt="2019-09-23T16:12:07.738" v="1"/>
-        <pc:sldMkLst>
-          <pc:docMk/>
-          <pc:sldMk cId="2140864898" sldId="2076136686"/>
-        </pc:sldMkLst>
-      </pc:sldChg>
-    </pc:docChg>
-  </pc:docChgLst>
-  <pc:docChgLst>
-    <pc:chgData name="Janet Thomas" userId="08421ffd-879b-47f6-8d7f-61067c13bd1e" providerId="ADAL" clId="{E1C964E4-6D26-4EBA-B07F-DB51A2804AD0}"/>
-    <pc:docChg chg="modSld">
-      <pc:chgData name="Janet Thomas" userId="08421ffd-879b-47f6-8d7f-61067c13bd1e" providerId="ADAL" clId="{E1C964E4-6D26-4EBA-B07F-DB51A2804AD0}" dt="2019-09-30T20:37:57.049" v="0"/>
-      <pc:docMkLst>
-        <pc:docMk/>
-      </pc:docMkLst>
     </pc:docChg>
   </pc:docChgLst>
   <pc:docChgLst>
@@ -973,6 +1425,30 @@
     </pc:docChg>
   </pc:docChgLst>
   <pc:docChgLst>
+    <pc:chgData name="Lorand Farkas" userId="6dd8c035-74a1-41f1-bcf4-8d01c12b1819" providerId="ADAL" clId="{0403F691-11D7-E549-B47E-F2649B2B3781}"/>
+    <pc:docChg chg="modSld">
+      <pc:chgData name="Lorand Farkas" userId="6dd8c035-74a1-41f1-bcf4-8d01c12b1819" providerId="ADAL" clId="{0403F691-11D7-E549-B47E-F2649B2B3781}" dt="2019-10-08T19:23:03.923" v="0" actId="1076"/>
+      <pc:docMkLst>
+        <pc:docMk/>
+      </pc:docMkLst>
+      <pc:sldChg chg="modSp">
+        <pc:chgData name="Lorand Farkas" userId="6dd8c035-74a1-41f1-bcf4-8d01c12b1819" providerId="ADAL" clId="{0403F691-11D7-E549-B47E-F2649B2B3781}" dt="2019-10-08T19:23:03.923" v="0" actId="1076"/>
+        <pc:sldMkLst>
+          <pc:docMk/>
+          <pc:sldMk cId="141977664" sldId="2076136639"/>
+        </pc:sldMkLst>
+        <pc:spChg chg="mod">
+          <ac:chgData name="Lorand Farkas" userId="6dd8c035-74a1-41f1-bcf4-8d01c12b1819" providerId="ADAL" clId="{0403F691-11D7-E549-B47E-F2649B2B3781}" dt="2019-10-08T19:23:03.923" v="0" actId="1076"/>
+          <ac:spMkLst>
+            <pc:docMk/>
+            <pc:sldMk cId="141977664" sldId="2076136639"/>
+            <ac:spMk id="8" creationId="{4E2D9699-B376-479B-BAF2-880A1A0D0335}"/>
+          </ac:spMkLst>
+        </pc:spChg>
+      </pc:sldChg>
+    </pc:docChg>
+  </pc:docChgLst>
+  <pc:docChgLst>
     <pc:chgData name="James Complin" userId="S::jacompli@microsoft.com::04684b05-a571-42a8-b582-bdb318c64b6d" providerId="AD" clId="Web-{72A9CA45-1B51-36FB-7CDA-4C74B3F93E4F}"/>
     <pc:docChg chg="">
       <pc:chgData name="James Complin" userId="S::jacompli@microsoft.com::04684b05-a571-42a8-b582-bdb318c64b6d" providerId="AD" clId="Web-{72A9CA45-1B51-36FB-7CDA-4C74B3F93E4F}" dt="2019-09-20T06:38:40.736" v="4"/>
@@ -998,486 +1474,6 @@
         <pc:sldMkLst>
           <pc:docMk/>
           <pc:sldMk cId="3216906863" sldId="2076136687"/>
-        </pc:sldMkLst>
-      </pc:sldChg>
-    </pc:docChg>
-  </pc:docChgLst>
-  <pc:docChgLst>
-    <pc:chgData name="Johan Grant" userId="S::jogrant@microsoft.com::4c19665d-e4ad-4a0a-a05e-a1053f6c6b5c" providerId="AD" clId="Web-{BC6688CD-D7BA-155E-1F59-9A2F9762427F}"/>
-    <pc:docChg chg="">
-      <pc:chgData name="Johan Grant" userId="S::jogrant@microsoft.com::4c19665d-e4ad-4a0a-a05e-a1053f6c6b5c" providerId="AD" clId="Web-{BC6688CD-D7BA-155E-1F59-9A2F9762427F}" dt="2019-09-23T03:10:30.651" v="14"/>
-      <pc:docMkLst>
-        <pc:docMk/>
-      </pc:docMkLst>
-      <pc:sldChg chg="addCm">
-        <pc:chgData name="Johan Grant" userId="S::jogrant@microsoft.com::4c19665d-e4ad-4a0a-a05e-a1053f6c6b5c" providerId="AD" clId="Web-{BC6688CD-D7BA-155E-1F59-9A2F9762427F}" dt="2019-09-23T01:43:37.205" v="5"/>
-        <pc:sldMkLst>
-          <pc:docMk/>
-          <pc:sldMk cId="837477126" sldId="2076136632"/>
-        </pc:sldMkLst>
-      </pc:sldChg>
-      <pc:sldChg chg="addCm">
-        <pc:chgData name="Johan Grant" userId="S::jogrant@microsoft.com::4c19665d-e4ad-4a0a-a05e-a1053f6c6b5c" providerId="AD" clId="Web-{BC6688CD-D7BA-155E-1F59-9A2F9762427F}" dt="2019-09-23T01:37:26.761" v="2"/>
-        <pc:sldMkLst>
-          <pc:docMk/>
-          <pc:sldMk cId="3600052600" sldId="2076136640"/>
-        </pc:sldMkLst>
-      </pc:sldChg>
-      <pc:sldChg chg="addCm delCm modCm">
-        <pc:chgData name="Johan Grant" userId="S::jogrant@microsoft.com::4c19665d-e4ad-4a0a-a05e-a1053f6c6b5c" providerId="AD" clId="Web-{BC6688CD-D7BA-155E-1F59-9A2F9762427F}" dt="2019-09-23T01:49:31.092" v="10"/>
-        <pc:sldMkLst>
-          <pc:docMk/>
-          <pc:sldMk cId="3373473442" sldId="2076136642"/>
-        </pc:sldMkLst>
-      </pc:sldChg>
-      <pc:sldChg chg="addCm">
-        <pc:chgData name="Johan Grant" userId="S::jogrant@microsoft.com::4c19665d-e4ad-4a0a-a05e-a1053f6c6b5c" providerId="AD" clId="Web-{BC6688CD-D7BA-155E-1F59-9A2F9762427F}" dt="2019-09-23T01:50:15.281" v="11"/>
-        <pc:sldMkLst>
-          <pc:docMk/>
-          <pc:sldMk cId="1352040138" sldId="2076136648"/>
-        </pc:sldMkLst>
-      </pc:sldChg>
-      <pc:sldChg chg="addCm modCm">
-        <pc:chgData name="Johan Grant" userId="S::jogrant@microsoft.com::4c19665d-e4ad-4a0a-a05e-a1053f6c6b5c" providerId="AD" clId="Web-{BC6688CD-D7BA-155E-1F59-9A2F9762427F}" dt="2019-09-23T03:09:48.479" v="13"/>
-        <pc:sldMkLst>
-          <pc:docMk/>
-          <pc:sldMk cId="3675644745" sldId="2076136651"/>
-        </pc:sldMkLst>
-      </pc:sldChg>
-      <pc:sldChg chg="addCm">
-        <pc:chgData name="Johan Grant" userId="S::jogrant@microsoft.com::4c19665d-e4ad-4a0a-a05e-a1053f6c6b5c" providerId="AD" clId="Web-{BC6688CD-D7BA-155E-1F59-9A2F9762427F}" dt="2019-09-23T03:10:30.651" v="14"/>
-        <pc:sldMkLst>
-          <pc:docMk/>
-          <pc:sldMk cId="2045845977" sldId="2076136653"/>
-        </pc:sldMkLst>
-      </pc:sldChg>
-      <pc:sldChg chg="addCm">
-        <pc:chgData name="Johan Grant" userId="S::jogrant@microsoft.com::4c19665d-e4ad-4a0a-a05e-a1053f6c6b5c" providerId="AD" clId="Web-{BC6688CD-D7BA-155E-1F59-9A2F9762427F}" dt="2019-09-23T01:40:00.516" v="3"/>
-        <pc:sldMkLst>
-          <pc:docMk/>
-          <pc:sldMk cId="2792427332" sldId="2076136654"/>
-        </pc:sldMkLst>
-      </pc:sldChg>
-      <pc:sldChg chg="addCm">
-        <pc:chgData name="Johan Grant" userId="S::jogrant@microsoft.com::4c19665d-e4ad-4a0a-a05e-a1053f6c6b5c" providerId="AD" clId="Web-{BC6688CD-D7BA-155E-1F59-9A2F9762427F}" dt="2019-09-23T01:41:38.830" v="4"/>
-        <pc:sldMkLst>
-          <pc:docMk/>
-          <pc:sldMk cId="2400275843" sldId="2076136681"/>
-        </pc:sldMkLst>
-      </pc:sldChg>
-    </pc:docChg>
-  </pc:docChgLst>
-  <pc:docChgLst>
-    <pc:chgData name="Lorand Farkas" userId="6dd8c035-74a1-41f1-bcf4-8d01c12b1819" providerId="ADAL" clId="{0403F691-11D7-E549-B47E-F2649B2B3781}"/>
-    <pc:docChg chg="modSld">
-      <pc:chgData name="Lorand Farkas" userId="6dd8c035-74a1-41f1-bcf4-8d01c12b1819" providerId="ADAL" clId="{0403F691-11D7-E549-B47E-F2649B2B3781}" dt="2019-10-08T19:23:03.923" v="0" actId="1076"/>
-      <pc:docMkLst>
-        <pc:docMk/>
-      </pc:docMkLst>
-      <pc:sldChg chg="modSp">
-        <pc:chgData name="Lorand Farkas" userId="6dd8c035-74a1-41f1-bcf4-8d01c12b1819" providerId="ADAL" clId="{0403F691-11D7-E549-B47E-F2649B2B3781}" dt="2019-10-08T19:23:03.923" v="0" actId="1076"/>
-        <pc:sldMkLst>
-          <pc:docMk/>
-          <pc:sldMk cId="141977664" sldId="2076136639"/>
-        </pc:sldMkLst>
-        <pc:spChg chg="mod">
-          <ac:chgData name="Lorand Farkas" userId="6dd8c035-74a1-41f1-bcf4-8d01c12b1819" providerId="ADAL" clId="{0403F691-11D7-E549-B47E-F2649B2B3781}" dt="2019-10-08T19:23:03.923" v="0" actId="1076"/>
-          <ac:spMkLst>
-            <pc:docMk/>
-            <pc:sldMk cId="141977664" sldId="2076136639"/>
-            <ac:spMk id="8" creationId="{4E2D9699-B376-479B-BAF2-880A1A0D0335}"/>
-          </ac:spMkLst>
-        </pc:spChg>
-      </pc:sldChg>
-    </pc:docChg>
-  </pc:docChgLst>
-  <pc:docChgLst>
-    <pc:chgData name="Wayne Meyer" userId="505e5828-32a7-4b23-b483-86ab7e4f6d84" providerId="ADAL" clId="{732092DD-500E-4ABF-849B-CDC879E857EB}"/>
-    <pc:docChg chg="undo custSel addSld modSld sldOrd addSection">
-      <pc:chgData name="Wayne Meyer" userId="505e5828-32a7-4b23-b483-86ab7e4f6d84" providerId="ADAL" clId="{732092DD-500E-4ABF-849B-CDC879E857EB}" dt="2019-10-04T19:34:53.569" v="4910" actId="20577"/>
-      <pc:docMkLst>
-        <pc:docMk/>
-      </pc:docMkLst>
-      <pc:sldChg chg="addCm modCm">
-        <pc:chgData name="Wayne Meyer" userId="505e5828-32a7-4b23-b483-86ab7e4f6d84" providerId="ADAL" clId="{732092DD-500E-4ABF-849B-CDC879E857EB}" dt="2019-09-20T20:31:28.015" v="2864"/>
-        <pc:sldMkLst>
-          <pc:docMk/>
-          <pc:sldMk cId="2206074536" sldId="1999"/>
-        </pc:sldMkLst>
-      </pc:sldChg>
-      <pc:sldChg chg="addCm modCm">
-        <pc:chgData name="Wayne Meyer" userId="505e5828-32a7-4b23-b483-86ab7e4f6d84" providerId="ADAL" clId="{732092DD-500E-4ABF-849B-CDC879E857EB}" dt="2019-09-16T20:54:09.044" v="216"/>
-        <pc:sldMkLst>
-          <pc:docMk/>
-          <pc:sldMk cId="1359849352" sldId="10557"/>
-        </pc:sldMkLst>
-      </pc:sldChg>
-      <pc:sldChg chg="ord">
-        <pc:chgData name="Wayne Meyer" userId="505e5828-32a7-4b23-b483-86ab7e4f6d84" providerId="ADAL" clId="{732092DD-500E-4ABF-849B-CDC879E857EB}" dt="2019-09-17T19:03:07.138" v="2352"/>
-        <pc:sldMkLst>
-          <pc:docMk/>
-          <pc:sldMk cId="2749409799" sldId="2076136631"/>
-        </pc:sldMkLst>
-      </pc:sldChg>
-      <pc:sldChg chg="addCm modCm">
-        <pc:chgData name="Wayne Meyer" userId="505e5828-32a7-4b23-b483-86ab7e4f6d84" providerId="ADAL" clId="{732092DD-500E-4ABF-849B-CDC879E857EB}" dt="2019-09-16T21:05:32.097" v="220"/>
-        <pc:sldMkLst>
-          <pc:docMk/>
-          <pc:sldMk cId="3803056413" sldId="2076136638"/>
-        </pc:sldMkLst>
-      </pc:sldChg>
-      <pc:sldChg chg="addCm">
-        <pc:chgData name="Wayne Meyer" userId="505e5828-32a7-4b23-b483-86ab7e4f6d84" providerId="ADAL" clId="{732092DD-500E-4ABF-849B-CDC879E857EB}" dt="2019-09-23T19:25:28.625" v="3201" actId="1589"/>
-        <pc:sldMkLst>
-          <pc:docMk/>
-          <pc:sldMk cId="3600052600" sldId="2076136640"/>
-        </pc:sldMkLst>
-      </pc:sldChg>
-      <pc:sldChg chg="modSp addCm">
-        <pc:chgData name="Wayne Meyer" userId="505e5828-32a7-4b23-b483-86ab7e4f6d84" providerId="ADAL" clId="{732092DD-500E-4ABF-849B-CDC879E857EB}" dt="2019-09-23T16:52:53.436" v="3197" actId="20577"/>
-        <pc:sldMkLst>
-          <pc:docMk/>
-          <pc:sldMk cId="3373473442" sldId="2076136642"/>
-        </pc:sldMkLst>
-        <pc:spChg chg="mod">
-          <ac:chgData name="Wayne Meyer" userId="505e5828-32a7-4b23-b483-86ab7e4f6d84" providerId="ADAL" clId="{732092DD-500E-4ABF-849B-CDC879E857EB}" dt="2019-09-23T16:52:53.436" v="3197" actId="20577"/>
-          <ac:spMkLst>
-            <pc:docMk/>
-            <pc:sldMk cId="3373473442" sldId="2076136642"/>
-            <ac:spMk id="4" creationId="{D0F4117A-D87C-4A68-8091-434B0BB4D79E}"/>
-          </ac:spMkLst>
-        </pc:spChg>
-      </pc:sldChg>
-      <pc:sldChg chg="addCm">
-        <pc:chgData name="Wayne Meyer" userId="505e5828-32a7-4b23-b483-86ab7e4f6d84" providerId="ADAL" clId="{732092DD-500E-4ABF-849B-CDC879E857EB}" dt="2019-09-23T16:50:02.624" v="3076" actId="1589"/>
-        <pc:sldMkLst>
-          <pc:docMk/>
-          <pc:sldMk cId="1352040138" sldId="2076136648"/>
-        </pc:sldMkLst>
-      </pc:sldChg>
-      <pc:sldChg chg="addCm modCm">
-        <pc:chgData name="Wayne Meyer" userId="505e5828-32a7-4b23-b483-86ab7e4f6d84" providerId="ADAL" clId="{732092DD-500E-4ABF-849B-CDC879E857EB}" dt="2019-09-16T20:57:54.838" v="218"/>
-        <pc:sldMkLst>
-          <pc:docMk/>
-          <pc:sldMk cId="2792427332" sldId="2076136654"/>
-        </pc:sldMkLst>
-      </pc:sldChg>
-      <pc:sldChg chg="addCm modCm">
-        <pc:chgData name="Wayne Meyer" userId="505e5828-32a7-4b23-b483-86ab7e4f6d84" providerId="ADAL" clId="{732092DD-500E-4ABF-849B-CDC879E857EB}" dt="2019-09-24T18:51:50.320" v="4585" actId="1589"/>
-        <pc:sldMkLst>
-          <pc:docMk/>
-          <pc:sldMk cId="1779733599" sldId="2076136657"/>
-        </pc:sldMkLst>
-      </pc:sldChg>
-      <pc:sldChg chg="addCm delCm">
-        <pc:chgData name="Wayne Meyer" userId="505e5828-32a7-4b23-b483-86ab7e4f6d84" providerId="ADAL" clId="{732092DD-500E-4ABF-849B-CDC879E857EB}" dt="2019-09-23T17:25:08.438" v="3200" actId="1592"/>
-        <pc:sldMkLst>
-          <pc:docMk/>
-          <pc:sldMk cId="3689659425" sldId="2076136658"/>
-        </pc:sldMkLst>
-      </pc:sldChg>
-      <pc:sldChg chg="addSp modSp addCm modCm">
-        <pc:chgData name="Wayne Meyer" userId="505e5828-32a7-4b23-b483-86ab7e4f6d84" providerId="ADAL" clId="{732092DD-500E-4ABF-849B-CDC879E857EB}" dt="2019-09-24T18:46:36.441" v="4584" actId="1076"/>
-        <pc:sldMkLst>
-          <pc:docMk/>
-          <pc:sldMk cId="2400275843" sldId="2076136681"/>
-        </pc:sldMkLst>
-        <pc:spChg chg="mod">
-          <ac:chgData name="Wayne Meyer" userId="505e5828-32a7-4b23-b483-86ab7e4f6d84" providerId="ADAL" clId="{732092DD-500E-4ABF-849B-CDC879E857EB}" dt="2019-09-16T21:07:30.567" v="223" actId="1076"/>
-          <ac:spMkLst>
-            <pc:docMk/>
-            <pc:sldMk cId="2400275843" sldId="2076136681"/>
-            <ac:spMk id="2" creationId="{BBB84D00-5465-4D6C-8B5A-46D1308CEA53}"/>
-          </ac:spMkLst>
-        </pc:spChg>
-        <pc:spChg chg="add mod">
-          <ac:chgData name="Wayne Meyer" userId="505e5828-32a7-4b23-b483-86ab7e4f6d84" providerId="ADAL" clId="{732092DD-500E-4ABF-849B-CDC879E857EB}" dt="2019-09-24T18:46:36.441" v="4584" actId="1076"/>
-          <ac:spMkLst>
-            <pc:docMk/>
-            <pc:sldMk cId="2400275843" sldId="2076136681"/>
-            <ac:spMk id="3" creationId="{44CBCD13-CA19-4BFA-BCE8-529AB9F3F9B3}"/>
-          </ac:spMkLst>
-        </pc:spChg>
-      </pc:sldChg>
-      <pc:sldChg chg="addSp modSp addCm modCm">
-        <pc:chgData name="Wayne Meyer" userId="505e5828-32a7-4b23-b483-86ab7e4f6d84" providerId="ADAL" clId="{732092DD-500E-4ABF-849B-CDC879E857EB}" dt="2019-09-25T17:14:37.491" v="4589"/>
-        <pc:sldMkLst>
-          <pc:docMk/>
-          <pc:sldMk cId="4085166417" sldId="2076136682"/>
-        </pc:sldMkLst>
-        <pc:spChg chg="mod">
-          <ac:chgData name="Wayne Meyer" userId="505e5828-32a7-4b23-b483-86ab7e4f6d84" providerId="ADAL" clId="{732092DD-500E-4ABF-849B-CDC879E857EB}" dt="2019-09-17T03:15:45.409" v="884" actId="1076"/>
-          <ac:spMkLst>
-            <pc:docMk/>
-            <pc:sldMk cId="4085166417" sldId="2076136682"/>
-            <ac:spMk id="2" creationId="{BBB84D00-5465-4D6C-8B5A-46D1308CEA53}"/>
-          </ac:spMkLst>
-        </pc:spChg>
-        <pc:spChg chg="add mod">
-          <ac:chgData name="Wayne Meyer" userId="505e5828-32a7-4b23-b483-86ab7e4f6d84" providerId="ADAL" clId="{732092DD-500E-4ABF-849B-CDC879E857EB}" dt="2019-09-17T15:02:29.381" v="1508" actId="1076"/>
-          <ac:spMkLst>
-            <pc:docMk/>
-            <pc:sldMk cId="4085166417" sldId="2076136682"/>
-            <ac:spMk id="3" creationId="{56116777-CBC1-4CBD-B255-FDDB899FFC61}"/>
-          </ac:spMkLst>
-        </pc:spChg>
-      </pc:sldChg>
-      <pc:sldChg chg="addSp modSp">
-        <pc:chgData name="Wayne Meyer" userId="505e5828-32a7-4b23-b483-86ab7e4f6d84" providerId="ADAL" clId="{732092DD-500E-4ABF-849B-CDC879E857EB}" dt="2019-10-04T19:33:18.749" v="4687" actId="20577"/>
-        <pc:sldMkLst>
-          <pc:docMk/>
-          <pc:sldMk cId="2252954663" sldId="2076136684"/>
-        </pc:sldMkLst>
-        <pc:spChg chg="mod">
-          <ac:chgData name="Wayne Meyer" userId="505e5828-32a7-4b23-b483-86ab7e4f6d84" providerId="ADAL" clId="{732092DD-500E-4ABF-849B-CDC879E857EB}" dt="2019-09-17T15:06:04.655" v="1509" actId="1076"/>
-          <ac:spMkLst>
-            <pc:docMk/>
-            <pc:sldMk cId="2252954663" sldId="2076136684"/>
-            <ac:spMk id="2" creationId="{BBB84D00-5465-4D6C-8B5A-46D1308CEA53}"/>
-          </ac:spMkLst>
-        </pc:spChg>
-        <pc:spChg chg="add mod">
-          <ac:chgData name="Wayne Meyer" userId="505e5828-32a7-4b23-b483-86ab7e4f6d84" providerId="ADAL" clId="{732092DD-500E-4ABF-849B-CDC879E857EB}" dt="2019-10-04T19:33:18.749" v="4687" actId="20577"/>
-          <ac:spMkLst>
-            <pc:docMk/>
-            <pc:sldMk cId="2252954663" sldId="2076136684"/>
-            <ac:spMk id="3" creationId="{6D28BB17-D855-423C-AF7E-755A194CBFF8}"/>
-          </ac:spMkLst>
-        </pc:spChg>
-      </pc:sldChg>
-      <pc:sldChg chg="addSp delSp modSp add modTransition addCm modCm">
-        <pc:chgData name="Wayne Meyer" userId="505e5828-32a7-4b23-b483-86ab7e4f6d84" providerId="ADAL" clId="{732092DD-500E-4ABF-849B-CDC879E857EB}" dt="2019-09-24T18:44:41.197" v="4583" actId="20577"/>
-        <pc:sldMkLst>
-          <pc:docMk/>
-          <pc:sldMk cId="2140864898" sldId="2076136686"/>
-        </pc:sldMkLst>
-        <pc:spChg chg="del">
-          <ac:chgData name="Wayne Meyer" userId="505e5828-32a7-4b23-b483-86ab7e4f6d84" providerId="ADAL" clId="{732092DD-500E-4ABF-849B-CDC879E857EB}" dt="2019-09-16T20:51:37.541" v="3"/>
-          <ac:spMkLst>
-            <pc:docMk/>
-            <pc:sldMk cId="2140864898" sldId="2076136686"/>
-            <ac:spMk id="2" creationId="{CCFD2B24-E7E2-4A89-8D65-3A5F5E4A3DC0}"/>
-          </ac:spMkLst>
-        </pc:spChg>
-        <pc:spChg chg="add mod">
-          <ac:chgData name="Wayne Meyer" userId="505e5828-32a7-4b23-b483-86ab7e4f6d84" providerId="ADAL" clId="{732092DD-500E-4ABF-849B-CDC879E857EB}" dt="2019-09-24T18:44:32.352" v="4553" actId="1076"/>
-          <ac:spMkLst>
-            <pc:docMk/>
-            <pc:sldMk cId="2140864898" sldId="2076136686"/>
-            <ac:spMk id="3" creationId="{92BDBA25-825B-4BB4-8E7F-8D0B2ED6A83E}"/>
-          </ac:spMkLst>
-        </pc:spChg>
-        <pc:spChg chg="add mod">
-          <ac:chgData name="Wayne Meyer" userId="505e5828-32a7-4b23-b483-86ab7e4f6d84" providerId="ADAL" clId="{732092DD-500E-4ABF-849B-CDC879E857EB}" dt="2019-09-17T19:40:41.445" v="2862" actId="20577"/>
-          <ac:spMkLst>
-            <pc:docMk/>
-            <pc:sldMk cId="2140864898" sldId="2076136686"/>
-            <ac:spMk id="4" creationId="{25873FDE-079D-4A37-A390-AB5EB17171C1}"/>
-          </ac:spMkLst>
-        </pc:spChg>
-        <pc:spChg chg="add mod">
-          <ac:chgData name="Wayne Meyer" userId="505e5828-32a7-4b23-b483-86ab7e4f6d84" providerId="ADAL" clId="{732092DD-500E-4ABF-849B-CDC879E857EB}" dt="2019-09-24T18:44:41.197" v="4583" actId="20577"/>
-          <ac:spMkLst>
-            <pc:docMk/>
-            <pc:sldMk cId="2140864898" sldId="2076136686"/>
-            <ac:spMk id="5" creationId="{0DC01527-1153-41F3-81EF-3C67D8DB7BE6}"/>
-          </ac:spMkLst>
-        </pc:spChg>
-      </pc:sldChg>
-      <pc:sldChg chg="addSp modSp add">
-        <pc:chgData name="Wayne Meyer" userId="505e5828-32a7-4b23-b483-86ab7e4f6d84" providerId="ADAL" clId="{732092DD-500E-4ABF-849B-CDC879E857EB}" dt="2019-09-20T20:32:26.531" v="2889" actId="20577"/>
-        <pc:sldMkLst>
-          <pc:docMk/>
-          <pc:sldMk cId="3216906863" sldId="2076136687"/>
-        </pc:sldMkLst>
-        <pc:spChg chg="mod">
-          <ac:chgData name="Wayne Meyer" userId="505e5828-32a7-4b23-b483-86ab7e4f6d84" providerId="ADAL" clId="{732092DD-500E-4ABF-849B-CDC879E857EB}" dt="2019-09-17T16:20:31.226" v="1883" actId="20577"/>
-          <ac:spMkLst>
-            <pc:docMk/>
-            <pc:sldMk cId="3216906863" sldId="2076136687"/>
-            <ac:spMk id="2" creationId="{0F1AFFC0-512C-40E5-8EB0-B3D8B34ED10E}"/>
-          </ac:spMkLst>
-        </pc:spChg>
-        <pc:spChg chg="add mod">
-          <ac:chgData name="Wayne Meyer" userId="505e5828-32a7-4b23-b483-86ab7e4f6d84" providerId="ADAL" clId="{732092DD-500E-4ABF-849B-CDC879E857EB}" dt="2019-09-17T19:14:17.195" v="2363" actId="1076"/>
-          <ac:spMkLst>
-            <pc:docMk/>
-            <pc:sldMk cId="3216906863" sldId="2076136687"/>
-            <ac:spMk id="3" creationId="{A3358EA3-C175-4114-8A10-1E536C6FFC0F}"/>
-          </ac:spMkLst>
-        </pc:spChg>
-        <pc:spChg chg="add mod">
-          <ac:chgData name="Wayne Meyer" userId="505e5828-32a7-4b23-b483-86ab7e4f6d84" providerId="ADAL" clId="{732092DD-500E-4ABF-849B-CDC879E857EB}" dt="2019-09-17T16:21:30.075" v="2017" actId="1076"/>
-          <ac:spMkLst>
-            <pc:docMk/>
-            <pc:sldMk cId="3216906863" sldId="2076136687"/>
-            <ac:spMk id="4" creationId="{D455950F-8144-4598-932F-C94B38450D43}"/>
-          </ac:spMkLst>
-        </pc:spChg>
-        <pc:spChg chg="add mod">
-          <ac:chgData name="Wayne Meyer" userId="505e5828-32a7-4b23-b483-86ab7e4f6d84" providerId="ADAL" clId="{732092DD-500E-4ABF-849B-CDC879E857EB}" dt="2019-09-20T20:32:26.531" v="2889" actId="20577"/>
-          <ac:spMkLst>
-            <pc:docMk/>
-            <pc:sldMk cId="3216906863" sldId="2076136687"/>
-            <ac:spMk id="6" creationId="{A5ED6BEB-CA71-4A3C-8C29-B27FA8B24764}"/>
-          </ac:spMkLst>
-        </pc:spChg>
-        <pc:picChg chg="add mod modCrop">
-          <ac:chgData name="Wayne Meyer" userId="505e5828-32a7-4b23-b483-86ab7e4f6d84" providerId="ADAL" clId="{732092DD-500E-4ABF-849B-CDC879E857EB}" dt="2019-09-17T19:14:29.261" v="2366" actId="1076"/>
-          <ac:picMkLst>
-            <pc:docMk/>
-            <pc:sldMk cId="3216906863" sldId="2076136687"/>
-            <ac:picMk id="5" creationId="{E013CE12-34D4-4328-9FE1-2FA4FFEF5E0F}"/>
-          </ac:picMkLst>
-        </pc:picChg>
-      </pc:sldChg>
-      <pc:sldChg chg="addSp modSp add">
-        <pc:chgData name="Wayne Meyer" userId="505e5828-32a7-4b23-b483-86ab7e4f6d84" providerId="ADAL" clId="{732092DD-500E-4ABF-849B-CDC879E857EB}" dt="2019-10-04T19:34:53.569" v="4910" actId="20577"/>
-        <pc:sldMkLst>
-          <pc:docMk/>
-          <pc:sldMk cId="161631102" sldId="2076136688"/>
-        </pc:sldMkLst>
-        <pc:spChg chg="mod">
-          <ac:chgData name="Wayne Meyer" userId="505e5828-32a7-4b23-b483-86ab7e4f6d84" providerId="ADAL" clId="{732092DD-500E-4ABF-849B-CDC879E857EB}" dt="2019-09-17T16:21:57.166" v="2028" actId="20577"/>
-          <ac:spMkLst>
-            <pc:docMk/>
-            <pc:sldMk cId="161631102" sldId="2076136688"/>
-            <ac:spMk id="2" creationId="{5D71C1A6-45E5-4F07-9EF4-8FD285FE66D7}"/>
-          </ac:spMkLst>
-        </pc:spChg>
-        <pc:spChg chg="add mod">
-          <ac:chgData name="Wayne Meyer" userId="505e5828-32a7-4b23-b483-86ab7e4f6d84" providerId="ADAL" clId="{732092DD-500E-4ABF-849B-CDC879E857EB}" dt="2019-10-04T19:34:53.569" v="4910" actId="20577"/>
-          <ac:spMkLst>
-            <pc:docMk/>
-            <pc:sldMk cId="161631102" sldId="2076136688"/>
-            <ac:spMk id="3" creationId="{05A126BA-131A-4F54-8EB4-5FCCF9009BB9}"/>
-          </ac:spMkLst>
-        </pc:spChg>
-      </pc:sldChg>
-      <pc:sldChg chg="addSp delSp modSp add">
-        <pc:chgData name="Wayne Meyer" userId="505e5828-32a7-4b23-b483-86ab7e4f6d84" providerId="ADAL" clId="{732092DD-500E-4ABF-849B-CDC879E857EB}" dt="2019-09-17T19:25:29.340" v="2780" actId="20577"/>
-        <pc:sldMkLst>
-          <pc:docMk/>
-          <pc:sldMk cId="1179338870" sldId="2076136689"/>
-        </pc:sldMkLst>
-        <pc:spChg chg="del">
-          <ac:chgData name="Wayne Meyer" userId="505e5828-32a7-4b23-b483-86ab7e4f6d84" providerId="ADAL" clId="{732092DD-500E-4ABF-849B-CDC879E857EB}" dt="2019-09-17T19:20:48.322" v="2368"/>
-          <ac:spMkLst>
-            <pc:docMk/>
-            <pc:sldMk cId="1179338870" sldId="2076136689"/>
-            <ac:spMk id="2" creationId="{57F9FA68-E135-4C84-B881-E5B2D70238B9}"/>
-          </ac:spMkLst>
-        </pc:spChg>
-        <pc:spChg chg="del">
-          <ac:chgData name="Wayne Meyer" userId="505e5828-32a7-4b23-b483-86ab7e4f6d84" providerId="ADAL" clId="{732092DD-500E-4ABF-849B-CDC879E857EB}" dt="2019-09-17T19:20:48.322" v="2368"/>
-          <ac:spMkLst>
-            <pc:docMk/>
-            <pc:sldMk cId="1179338870" sldId="2076136689"/>
-            <ac:spMk id="3" creationId="{46FD7A56-DD0C-4B60-87D5-A3E77E95162D}"/>
-          </ac:spMkLst>
-        </pc:spChg>
-        <pc:spChg chg="del">
-          <ac:chgData name="Wayne Meyer" userId="505e5828-32a7-4b23-b483-86ab7e4f6d84" providerId="ADAL" clId="{732092DD-500E-4ABF-849B-CDC879E857EB}" dt="2019-09-17T19:20:48.322" v="2368"/>
-          <ac:spMkLst>
-            <pc:docMk/>
-            <pc:sldMk cId="1179338870" sldId="2076136689"/>
-            <ac:spMk id="4" creationId="{1341805B-CE13-4264-8ACF-C82710FF546F}"/>
-          </ac:spMkLst>
-        </pc:spChg>
-        <pc:spChg chg="add mod">
-          <ac:chgData name="Wayne Meyer" userId="505e5828-32a7-4b23-b483-86ab7e4f6d84" providerId="ADAL" clId="{732092DD-500E-4ABF-849B-CDC879E857EB}" dt="2019-09-17T19:20:55.937" v="2394" actId="20577"/>
-          <ac:spMkLst>
-            <pc:docMk/>
-            <pc:sldMk cId="1179338870" sldId="2076136689"/>
-            <ac:spMk id="5" creationId="{6B9D8A96-53EB-4BDA-90A6-F5FB0DBF2131}"/>
-          </ac:spMkLst>
-        </pc:spChg>
-        <pc:spChg chg="add mod">
-          <ac:chgData name="Wayne Meyer" userId="505e5828-32a7-4b23-b483-86ab7e4f6d84" providerId="ADAL" clId="{732092DD-500E-4ABF-849B-CDC879E857EB}" dt="2019-09-17T19:25:29.340" v="2780" actId="20577"/>
-          <ac:spMkLst>
-            <pc:docMk/>
-            <pc:sldMk cId="1179338870" sldId="2076136689"/>
-            <ac:spMk id="6" creationId="{528A090E-4917-427D-8C02-38274B925CA2}"/>
-          </ac:spMkLst>
-        </pc:spChg>
-      </pc:sldChg>
-      <pc:sldChg chg="addSp modSp add modTransition">
-        <pc:chgData name="Wayne Meyer" userId="505e5828-32a7-4b23-b483-86ab7e4f6d84" providerId="ADAL" clId="{732092DD-500E-4ABF-849B-CDC879E857EB}" dt="2019-09-24T18:41:52.641" v="4430" actId="404"/>
-        <pc:sldMkLst>
-          <pc:docMk/>
-          <pc:sldMk cId="3112863487" sldId="2076136691"/>
-        </pc:sldMkLst>
-        <pc:spChg chg="mod">
-          <ac:chgData name="Wayne Meyer" userId="505e5828-32a7-4b23-b483-86ab7e4f6d84" providerId="ADAL" clId="{732092DD-500E-4ABF-849B-CDC879E857EB}" dt="2019-09-24T18:30:12.913" v="3658" actId="1076"/>
-          <ac:spMkLst>
-            <pc:docMk/>
-            <pc:sldMk cId="3112863487" sldId="2076136691"/>
-            <ac:spMk id="2" creationId="{D1C6060C-4A01-4A69-99E3-F37D20F69C89}"/>
-          </ac:spMkLst>
-        </pc:spChg>
-        <pc:spChg chg="mod">
-          <ac:chgData name="Wayne Meyer" userId="505e5828-32a7-4b23-b483-86ab7e4f6d84" providerId="ADAL" clId="{732092DD-500E-4ABF-849B-CDC879E857EB}" dt="2019-09-24T18:41:52.641" v="4430" actId="404"/>
-          <ac:spMkLst>
-            <pc:docMk/>
-            <pc:sldMk cId="3112863487" sldId="2076136691"/>
-            <ac:spMk id="3" creationId="{0E5F9931-64E2-4AB3-81DA-C1E7D926DCC3}"/>
-          </ac:spMkLst>
-        </pc:spChg>
-        <pc:spChg chg="add mod">
-          <ac:chgData name="Wayne Meyer" userId="505e5828-32a7-4b23-b483-86ab7e4f6d84" providerId="ADAL" clId="{732092DD-500E-4ABF-849B-CDC879E857EB}" dt="2019-09-24T18:28:00.330" v="3404" actId="1076"/>
-          <ac:spMkLst>
-            <pc:docMk/>
-            <pc:sldMk cId="3112863487" sldId="2076136691"/>
-            <ac:spMk id="5" creationId="{4D05DA9D-7D40-4BBB-8B4B-9748AC5EC3CA}"/>
-          </ac:spMkLst>
-        </pc:spChg>
-        <pc:spChg chg="add mod">
-          <ac:chgData name="Wayne Meyer" userId="505e5828-32a7-4b23-b483-86ab7e4f6d84" providerId="ADAL" clId="{732092DD-500E-4ABF-849B-CDC879E857EB}" dt="2019-09-24T18:34:11.002" v="3933" actId="1076"/>
-          <ac:spMkLst>
-            <pc:docMk/>
-            <pc:sldMk cId="3112863487" sldId="2076136691"/>
-            <ac:spMk id="6" creationId="{D79416E0-7232-4686-8906-83ED9D7D29B1}"/>
-          </ac:spMkLst>
-        </pc:spChg>
-        <pc:spChg chg="add mod">
-          <ac:chgData name="Wayne Meyer" userId="505e5828-32a7-4b23-b483-86ab7e4f6d84" providerId="ADAL" clId="{732092DD-500E-4ABF-849B-CDC879E857EB}" dt="2019-09-24T18:41:42.659" v="4429" actId="20577"/>
-          <ac:spMkLst>
-            <pc:docMk/>
-            <pc:sldMk cId="3112863487" sldId="2076136691"/>
-            <ac:spMk id="7" creationId="{EA0B07BB-4C8D-43F4-A71C-AA01CF5124E3}"/>
-          </ac:spMkLst>
-        </pc:spChg>
-      </pc:sldChg>
-    </pc:docChg>
-  </pc:docChgLst>
-  <pc:docChgLst>
-    <pc:chgData name="James Complin" userId="S::jacompli@microsoft.com::04684b05-a571-42a8-b582-bdb318c64b6d" providerId="AD" clId="Web-{6E2BD9A2-79E1-DD20-293F-AB4B63067C62}"/>
-    <pc:docChg chg="">
-      <pc:chgData name="James Complin" userId="S::jacompli@microsoft.com::04684b05-a571-42a8-b582-bdb318c64b6d" providerId="AD" clId="Web-{6E2BD9A2-79E1-DD20-293F-AB4B63067C62}" dt="2019-09-23T12:52:13.169" v="0"/>
-      <pc:docMkLst>
-        <pc:docMk/>
-      </pc:docMkLst>
-      <pc:sldChg chg="addCm">
-        <pc:chgData name="James Complin" userId="S::jacompli@microsoft.com::04684b05-a571-42a8-b582-bdb318c64b6d" providerId="AD" clId="Web-{6E2BD9A2-79E1-DD20-293F-AB4B63067C62}" dt="2019-09-23T12:52:13.169" v="0"/>
-        <pc:sldMkLst>
-          <pc:docMk/>
-          <pc:sldMk cId="1779733599" sldId="2076136657"/>
-        </pc:sldMkLst>
-      </pc:sldChg>
-    </pc:docChg>
-  </pc:docChgLst>
-  <pc:docChgLst>
-    <pc:chgData name="Pablo Sanchez" userId="S::pablosp@microsoft.com::0f48470a-3c87-4ba9-ac2f-63e38402478e" providerId="AD" clId="Web-{18057856-640E-5ADB-1ABF-B74462082AF2}"/>
-    <pc:docChg chg="">
-      <pc:chgData name="Pablo Sanchez" userId="S::pablosp@microsoft.com::0f48470a-3c87-4ba9-ac2f-63e38402478e" providerId="AD" clId="Web-{18057856-640E-5ADB-1ABF-B74462082AF2}" dt="2019-09-24T19:39:25.095" v="0"/>
-      <pc:docMkLst>
-        <pc:docMk/>
-      </pc:docMkLst>
-      <pc:sldChg chg="addCm">
-        <pc:chgData name="Pablo Sanchez" userId="S::pablosp@microsoft.com::0f48470a-3c87-4ba9-ac2f-63e38402478e" providerId="AD" clId="Web-{18057856-640E-5ADB-1ABF-B74462082AF2}" dt="2019-09-24T19:39:25.095" v="0"/>
-        <pc:sldMkLst>
-          <pc:docMk/>
-          <pc:sldMk cId="4085166417" sldId="2076136682"/>
         </pc:sldMkLst>
       </pc:sldChg>
     </pc:docChg>
@@ -1510,6 +1506,15 @@
           <pc:sldMk cId="2252954663" sldId="2076136684"/>
         </pc:sldMkLst>
       </pc:sldChg>
+    </pc:docChg>
+  </pc:docChgLst>
+  <pc:docChgLst>
+    <pc:chgData name="Janet Thomas" userId="08421ffd-879b-47f6-8d7f-61067c13bd1e" providerId="ADAL" clId="{E1C964E4-6D26-4EBA-B07F-DB51A2804AD0}"/>
+    <pc:docChg chg="modSld">
+      <pc:chgData name="Janet Thomas" userId="08421ffd-879b-47f6-8d7f-61067c13bd1e" providerId="ADAL" clId="{E1C964E4-6D26-4EBA-B07F-DB51A2804AD0}" dt="2019-09-30T20:37:57.049" v="0"/>
+      <pc:docMkLst>
+        <pc:docMk/>
+      </pc:docMkLst>
     </pc:docChg>
   </pc:docChgLst>
   <pc:docChgLst>
@@ -1578,54 +1583,49 @@
     </pc:docChg>
   </pc:docChgLst>
   <pc:docChgLst>
-    <pc:chgData name="Wayne Meyer" userId="S::wayneme@microsoft.com::505e5828-32a7-4b23-b483-86ab7e4f6d84" providerId="AD" clId="Web-{593F3947-FF3C-5F86-C4C7-0864FF8E9CDF}"/>
-    <pc:docChg chg="modSld">
-      <pc:chgData name="Wayne Meyer" userId="S::wayneme@microsoft.com::505e5828-32a7-4b23-b483-86ab7e4f6d84" providerId="AD" clId="Web-{593F3947-FF3C-5F86-C4C7-0864FF8E9CDF}" dt="2019-09-20T13:32:49.456" v="71"/>
+    <pc:chgData name="James Complin" userId="S::jacompli@microsoft.com::04684b05-a571-42a8-b582-bdb318c64b6d" providerId="AD" clId="Web-{6E2BD9A2-79E1-DD20-293F-AB4B63067C62}"/>
+    <pc:docChg chg="">
+      <pc:chgData name="James Complin" userId="S::jacompli@microsoft.com::04684b05-a571-42a8-b582-bdb318c64b6d" providerId="AD" clId="Web-{6E2BD9A2-79E1-DD20-293F-AB4B63067C62}" dt="2019-09-23T12:52:13.169" v="0"/>
       <pc:docMkLst>
         <pc:docMk/>
       </pc:docMkLst>
-      <pc:sldChg chg="modSp addCm">
-        <pc:chgData name="Wayne Meyer" userId="S::wayneme@microsoft.com::505e5828-32a7-4b23-b483-86ab7e4f6d84" providerId="AD" clId="Web-{593F3947-FF3C-5F86-C4C7-0864FF8E9CDF}" dt="2019-09-20T13:32:49.456" v="71"/>
-        <pc:sldMkLst>
-          <pc:docMk/>
-          <pc:sldMk cId="2206074536" sldId="1999"/>
-        </pc:sldMkLst>
-        <pc:spChg chg="mod">
-          <ac:chgData name="Wayne Meyer" userId="S::wayneme@microsoft.com::505e5828-32a7-4b23-b483-86ab7e4f6d84" providerId="AD" clId="Web-{593F3947-FF3C-5F86-C4C7-0864FF8E9CDF}" dt="2019-09-20T13:32:22.189" v="68" actId="20577"/>
-          <ac:spMkLst>
-            <pc:docMk/>
-            <pc:sldMk cId="2206074536" sldId="1999"/>
-            <ac:spMk id="2" creationId="{00000000-0000-0000-0000-000000000000}"/>
-          </ac:spMkLst>
-        </pc:spChg>
-      </pc:sldChg>
-      <pc:sldChg chg="addSp modSp">
-        <pc:chgData name="Wayne Meyer" userId="S::wayneme@microsoft.com::505e5828-32a7-4b23-b483-86ab7e4f6d84" providerId="AD" clId="Web-{593F3947-FF3C-5F86-C4C7-0864FF8E9CDF}" dt="2019-09-20T13:30:43.171" v="32" actId="20577"/>
-        <pc:sldMkLst>
-          <pc:docMk/>
-          <pc:sldMk cId="3600052600" sldId="2076136640"/>
-        </pc:sldMkLst>
-        <pc:spChg chg="add mod">
-          <ac:chgData name="Wayne Meyer" userId="S::wayneme@microsoft.com::505e5828-32a7-4b23-b483-86ab7e4f6d84" providerId="AD" clId="Web-{593F3947-FF3C-5F86-C4C7-0864FF8E9CDF}" dt="2019-09-20T13:30:43.171" v="32" actId="20577"/>
-          <ac:spMkLst>
-            <pc:docMk/>
-            <pc:sldMk cId="3600052600" sldId="2076136640"/>
-            <ac:spMk id="11" creationId="{7B3F2D36-B35E-4B6A-B837-C0ACF97D6ED5}"/>
-          </ac:spMkLst>
-        </pc:spChg>
-      </pc:sldChg>
       <pc:sldChg chg="addCm">
-        <pc:chgData name="Wayne Meyer" userId="S::wayneme@microsoft.com::505e5828-32a7-4b23-b483-86ab7e4f6d84" providerId="AD" clId="Web-{593F3947-FF3C-5F86-C4C7-0864FF8E9CDF}" dt="2019-09-20T13:31:49.108" v="33"/>
+        <pc:chgData name="James Complin" userId="S::jacompli@microsoft.com::04684b05-a571-42a8-b582-bdb318c64b6d" providerId="AD" clId="Web-{6E2BD9A2-79E1-DD20-293F-AB4B63067C62}" dt="2019-09-23T12:52:13.169" v="0"/>
         <pc:sldMkLst>
           <pc:docMk/>
           <pc:sldMk cId="1779733599" sldId="2076136657"/>
         </pc:sldMkLst>
       </pc:sldChg>
+    </pc:docChg>
+  </pc:docChgLst>
+  <pc:docChgLst>
+    <pc:chgData name="Pablo Sanchez" userId="S::pablosp@microsoft.com::0f48470a-3c87-4ba9-ac2f-63e38402478e" providerId="AD" clId="Web-{18057856-640E-5ADB-1ABF-B74462082AF2}"/>
+    <pc:docChg chg="">
+      <pc:chgData name="Pablo Sanchez" userId="S::pablosp@microsoft.com::0f48470a-3c87-4ba9-ac2f-63e38402478e" providerId="AD" clId="Web-{18057856-640E-5ADB-1ABF-B74462082AF2}" dt="2019-09-24T19:39:25.095" v="0"/>
+      <pc:docMkLst>
+        <pc:docMk/>
+      </pc:docMkLst>
       <pc:sldChg chg="addCm">
-        <pc:chgData name="Wayne Meyer" userId="S::wayneme@microsoft.com::505e5828-32a7-4b23-b483-86ab7e4f6d84" providerId="AD" clId="Web-{593F3947-FF3C-5F86-C4C7-0864FF8E9CDF}" dt="2019-09-20T13:29:37.092" v="0"/>
+        <pc:chgData name="Pablo Sanchez" userId="S::pablosp@microsoft.com::0f48470a-3c87-4ba9-ac2f-63e38402478e" providerId="AD" clId="Web-{18057856-640E-5ADB-1ABF-B74462082AF2}" dt="2019-09-24T19:39:25.095" v="0"/>
         <pc:sldMkLst>
           <pc:docMk/>
-          <pc:sldMk cId="3216906863" sldId="2076136687"/>
+          <pc:sldMk cId="4085166417" sldId="2076136682"/>
+        </pc:sldMkLst>
+      </pc:sldChg>
+    </pc:docChg>
+  </pc:docChgLst>
+  <pc:docChgLst>
+    <pc:chgData name="Janet Thomas" userId="08421ffd-879b-47f6-8d7f-61067c13bd1e" providerId="ADAL" clId="{32BA6DE9-A52C-4CD4-95BA-DA4899EA0E66}"/>
+    <pc:docChg chg="">
+      <pc:chgData name="Janet Thomas" userId="08421ffd-879b-47f6-8d7f-61067c13bd1e" providerId="ADAL" clId="{32BA6DE9-A52C-4CD4-95BA-DA4899EA0E66}" dt="2019-09-17T16:39:48.421" v="0" actId="5900"/>
+      <pc:docMkLst>
+        <pc:docMk/>
+      </pc:docMkLst>
+      <pc:sldChg chg="modCm">
+        <pc:chgData name="Janet Thomas" userId="08421ffd-879b-47f6-8d7f-61067c13bd1e" providerId="ADAL" clId="{32BA6DE9-A52C-4CD4-95BA-DA4899EA0E66}" dt="2019-09-17T16:39:48.421" v="0" actId="5900"/>
+        <pc:sldMkLst>
+          <pc:docMk/>
+          <pc:sldMk cId="3803056413" sldId="2076136638"/>
         </pc:sldMkLst>
       </pc:sldChg>
     </pc:docChg>
@@ -1778,7 +1778,7 @@
           <a:p>
             <a:fld id="{295BC766-E5BA-40F8-9F5F-937F32F5E837}" type="datetimeFigureOut">
               <a:rPr lang="en-US" smtClean="0"/>
-              <a:t>11/17/2019</a:t>
+              <a:t>11/18/2019</a:t>
             </a:fld>
             <a:endParaRPr lang="en-US"/>
           </a:p>
@@ -2266,7 +2266,7 @@
                 <a:tabLst/>
                 <a:defRPr/>
               </a:pPr>
-              <a:t>11/17/2019 10:22 PM</a:t>
+              <a:t>11/18/2019 10:54 AM</a:t>
             </a:fld>
             <a:endParaRPr kumimoji="0" lang="en-US" sz="1200" b="0" i="0" u="none" strike="noStrike" kern="1200" cap="none" spc="0" normalizeH="0" baseline="0" noProof="0">
               <a:ln>
@@ -2602,7 +2602,7 @@
                 <a:tabLst/>
                 <a:defRPr/>
               </a:pPr>
-              <a:t>11/17/2019 10:22 PM</a:t>
+              <a:t>11/18/2019 10:54 AM</a:t>
             </a:fld>
             <a:endParaRPr kumimoji="0" lang="en-US" sz="1200" b="0" i="0" u="none" strike="noStrike" kern="1200" cap="none" spc="0" normalizeH="0" baseline="0" noProof="0">
               <a:ln>
@@ -3190,7 +3190,7 @@
                 <a:tabLst/>
                 <a:defRPr/>
               </a:pPr>
-              <a:t>11/17/2019 10:22 PM</a:t>
+              <a:t>11/18/2019 10:54 AM</a:t>
             </a:fld>
             <a:endParaRPr kumimoji="0" lang="en-US" sz="1200" b="0" i="0" u="none" strike="noStrike" kern="1200" cap="none" spc="0" normalizeH="0" baseline="0" noProof="0">
               <a:ln>
@@ -3452,7 +3452,7 @@
           <a:p>
             <a:fld id="{B8F212EF-2DB5-4B5E-9054-0A301D6C4C73}" type="datetimeFigureOut">
               <a:rPr lang="en-US" smtClean="0"/>
-              <a:t>11/17/2019</a:t>
+              <a:t>11/18/2019</a:t>
             </a:fld>
             <a:endParaRPr lang="en-US"/>
           </a:p>
@@ -3650,7 +3650,7 @@
           <a:p>
             <a:fld id="{B8F212EF-2DB5-4B5E-9054-0A301D6C4C73}" type="datetimeFigureOut">
               <a:rPr lang="en-US" smtClean="0"/>
-              <a:t>11/17/2019</a:t>
+              <a:t>11/18/2019</a:t>
             </a:fld>
             <a:endParaRPr lang="en-US"/>
           </a:p>
@@ -3858,7 +3858,7 @@
           <a:p>
             <a:fld id="{B8F212EF-2DB5-4B5E-9054-0A301D6C4C73}" type="datetimeFigureOut">
               <a:rPr lang="en-US" smtClean="0"/>
-              <a:t>11/17/2019</a:t>
+              <a:t>11/18/2019</a:t>
             </a:fld>
             <a:endParaRPr lang="en-US"/>
           </a:p>
@@ -7417,7 +7417,7 @@
           <a:p>
             <a:fld id="{B8F212EF-2DB5-4B5E-9054-0A301D6C4C73}" type="datetimeFigureOut">
               <a:rPr lang="en-US" smtClean="0"/>
-              <a:t>11/17/2019</a:t>
+              <a:t>11/18/2019</a:t>
             </a:fld>
             <a:endParaRPr lang="en-US"/>
           </a:p>
@@ -10439,7 +10439,7 @@
           <a:p>
             <a:fld id="{B8F212EF-2DB5-4B5E-9054-0A301D6C4C73}" type="datetimeFigureOut">
               <a:rPr lang="en-US" smtClean="0"/>
-              <a:t>11/17/2019</a:t>
+              <a:t>11/18/2019</a:t>
             </a:fld>
             <a:endParaRPr lang="en-US"/>
           </a:p>
@@ -12544,7 +12544,7 @@
           <a:p>
             <a:fld id="{B8F212EF-2DB5-4B5E-9054-0A301D6C4C73}" type="datetimeFigureOut">
               <a:rPr lang="en-US" smtClean="0"/>
-              <a:t>11/17/2019</a:t>
+              <a:t>11/18/2019</a:t>
             </a:fld>
             <a:endParaRPr lang="en-US"/>
           </a:p>
@@ -13692,7 +13692,7 @@
           <a:p>
             <a:fld id="{B8F212EF-2DB5-4B5E-9054-0A301D6C4C73}" type="datetimeFigureOut">
               <a:rPr lang="en-US" smtClean="0"/>
-              <a:t>11/17/2019</a:t>
+              <a:t>11/18/2019</a:t>
             </a:fld>
             <a:endParaRPr lang="en-US"/>
           </a:p>
@@ -13833,7 +13833,7 @@
           <a:p>
             <a:fld id="{B8F212EF-2DB5-4B5E-9054-0A301D6C4C73}" type="datetimeFigureOut">
               <a:rPr lang="en-US" smtClean="0"/>
-              <a:t>11/17/2019</a:t>
+              <a:t>11/18/2019</a:t>
             </a:fld>
             <a:endParaRPr lang="en-US"/>
           </a:p>
@@ -13946,7 +13946,7 @@
           <a:p>
             <a:fld id="{B8F212EF-2DB5-4B5E-9054-0A301D6C4C73}" type="datetimeFigureOut">
               <a:rPr lang="en-US" smtClean="0"/>
-              <a:t>11/17/2019</a:t>
+              <a:t>11/18/2019</a:t>
             </a:fld>
             <a:endParaRPr lang="en-US"/>
           </a:p>
@@ -14257,7 +14257,7 @@
           <a:p>
             <a:fld id="{B8F212EF-2DB5-4B5E-9054-0A301D6C4C73}" type="datetimeFigureOut">
               <a:rPr lang="en-US" smtClean="0"/>
-              <a:t>11/17/2019</a:t>
+              <a:t>11/18/2019</a:t>
             </a:fld>
             <a:endParaRPr lang="en-US"/>
           </a:p>
@@ -14545,7 +14545,7 @@
           <a:p>
             <a:fld id="{B8F212EF-2DB5-4B5E-9054-0A301D6C4C73}" type="datetimeFigureOut">
               <a:rPr lang="en-US" smtClean="0"/>
-              <a:t>11/17/2019</a:t>
+              <a:t>11/18/2019</a:t>
             </a:fld>
             <a:endParaRPr lang="en-US"/>
           </a:p>
@@ -14786,7 +14786,7 @@
           <a:p>
             <a:fld id="{B8F212EF-2DB5-4B5E-9054-0A301D6C4C73}" type="datetimeFigureOut">
               <a:rPr lang="en-US" smtClean="0"/>
-              <a:t>11/17/2019</a:t>
+              <a:t>11/18/2019</a:t>
             </a:fld>
             <a:endParaRPr lang="en-US"/>
           </a:p>
@@ -23396,7 +23396,7 @@
 </file>
 
 <file path=ppt/slides/slide2.xml><?xml version="1.0" encoding="utf-8"?>
-<p:sld xmlns:a="http://schemas.openxmlformats.org/drawingml/2006/main" xmlns:r="http://schemas.openxmlformats.org/officeDocument/2006/relationships" xmlns:p="http://schemas.openxmlformats.org/presentationml/2006/main" show="0">
+<p:sld xmlns:a="http://schemas.openxmlformats.org/drawingml/2006/main" xmlns:r="http://schemas.openxmlformats.org/officeDocument/2006/relationships" xmlns:p="http://schemas.openxmlformats.org/presentationml/2006/main">
   <p:cSld>
     <p:spTree>
       <p:nvGrpSpPr>
@@ -25375,7 +25375,7 @@
           <a:graphicData uri="http://schemas.openxmlformats.org/presentationml/2006/ole">
             <mc:AlternateContent xmlns:mc="http://schemas.openxmlformats.org/markup-compatibility/2006">
               <mc:Choice xmlns:v="urn:schemas-microsoft-com:vml" Requires="v">
-                <p:oleObj spid="_x0000_s1027" name="Bitmap Image" r:id="rId3" imgW="8963090" imgH="3662389" progId="Paint.Picture">
+                <p:oleObj spid="_x0000_s1029" name="Bitmap Image" r:id="rId3" imgW="8963090" imgH="3662389" progId="Paint.Picture">
                   <p:embed/>
                 </p:oleObj>
               </mc:Choice>
@@ -26149,7 +26149,7 @@
 </file>
 
 <file path=ppt/slides/slide3.xml><?xml version="1.0" encoding="utf-8"?>
-<p:sld xmlns:a="http://schemas.openxmlformats.org/drawingml/2006/main" xmlns:r="http://schemas.openxmlformats.org/officeDocument/2006/relationships" xmlns:p="http://schemas.openxmlformats.org/presentationml/2006/main" show="0">
+<p:sld xmlns:a="http://schemas.openxmlformats.org/drawingml/2006/main" xmlns:r="http://schemas.openxmlformats.org/officeDocument/2006/relationships" xmlns:p="http://schemas.openxmlformats.org/presentationml/2006/main">
   <p:cSld>
     <p:spTree>
       <p:nvGrpSpPr>
@@ -31042,7 +31042,7 @@
 </file>
 
 <file path=ppt/slides/slide4.xml><?xml version="1.0" encoding="utf-8"?>
-<p:sld xmlns:a="http://schemas.openxmlformats.org/drawingml/2006/main" xmlns:r="http://schemas.openxmlformats.org/officeDocument/2006/relationships" xmlns:p="http://schemas.openxmlformats.org/presentationml/2006/main" show="0">
+<p:sld xmlns:a="http://schemas.openxmlformats.org/drawingml/2006/main" xmlns:r="http://schemas.openxmlformats.org/officeDocument/2006/relationships" xmlns:p="http://schemas.openxmlformats.org/presentationml/2006/main">
   <p:cSld>
     <p:spTree>
       <p:nvGrpSpPr>
@@ -43694,15 +43694,6 @@
 </file>
 
 <file path=customXml/item1.xml><?xml version="1.0" encoding="utf-8"?>
-<?mso-contentType ?>
-<FormTemplates xmlns="http://schemas.microsoft.com/sharepoint/v3/contenttype/forms">
-  <Display>DocumentLibraryForm</Display>
-  <Edit>DocumentLibraryForm</Edit>
-  <New>DocumentLibraryForm</New>
-</FormTemplates>
-</file>
-
-<file path=customXml/item2.xml><?xml version="1.0" encoding="utf-8"?>
 <ct:contentTypeSchema xmlns:ct="http://schemas.microsoft.com/office/2006/metadata/contentType" xmlns:ma="http://schemas.microsoft.com/office/2006/metadata/properties/metaAttributes" ct:_="" ma:_="" ma:contentTypeName="Document" ma:contentTypeID="0x010100F4EB56A014601647A8A96FC1FEAD7A4D" ma:contentTypeVersion="12" ma:contentTypeDescription="Create a new document." ma:contentTypeScope="" ma:versionID="039d7d63a445aa03b8bd7f7ada1479db">
   <xsd:schema xmlns:xsd="http://www.w3.org/2001/XMLSchema" xmlns:xs="http://www.w3.org/2001/XMLSchema" xmlns:p="http://schemas.microsoft.com/office/2006/metadata/properties" xmlns:ns2="9f9f0ed7-b6e7-4e0d-9b4d-b4e73fb1e1ba" xmlns:ns3="5d0a0686-a3c6-401e-8596-31c6446e2673" targetNamespace="http://schemas.microsoft.com/office/2006/metadata/properties" ma:root="true" ma:fieldsID="582baf147af40f8fdb4c1d5a9911735e" ns2:_="" ns3:_="">
     <xsd:import namespace="9f9f0ed7-b6e7-4e0d-9b4d-b4e73fb1e1ba"/>
@@ -43919,6 +43910,15 @@
 </ct:contentTypeSchema>
 </file>
 
+<file path=customXml/item2.xml><?xml version="1.0" encoding="utf-8"?>
+<?mso-contentType ?>
+<FormTemplates xmlns="http://schemas.microsoft.com/sharepoint/v3/contenttype/forms">
+  <Display>DocumentLibraryForm</Display>
+  <Edit>DocumentLibraryForm</Edit>
+  <New>DocumentLibraryForm</New>
+</FormTemplates>
+</file>
+
 <file path=customXml/item3.xml><?xml version="1.0" encoding="utf-8"?>
 <p:properties xmlns:p="http://schemas.microsoft.com/office/2006/metadata/properties" xmlns:xsi="http://www.w3.org/2001/XMLSchema-instance" xmlns:pc="http://schemas.microsoft.com/office/infopath/2007/PartnerControls">
   <documentManagement>
@@ -43935,14 +43935,6 @@
 </file>
 
 <file path=customXml/itemProps1.xml><?xml version="1.0" encoding="utf-8"?>
-<ds:datastoreItem xmlns:ds="http://schemas.openxmlformats.org/officeDocument/2006/customXml" ds:itemID="{7B9985E7-F7C6-4958-AABD-0B7F8BC31F4D}">
-  <ds:schemaRefs>
-    <ds:schemaRef ds:uri="http://schemas.microsoft.com/sharepoint/v3/contenttype/forms"/>
-  </ds:schemaRefs>
-</ds:datastoreItem>
-</file>
-
-<file path=customXml/itemProps2.xml><?xml version="1.0" encoding="utf-8"?>
 <ds:datastoreItem xmlns:ds="http://schemas.openxmlformats.org/officeDocument/2006/customXml" ds:itemID="{7641848F-4641-433D-B2F8-DCE7FC22C672}">
   <ds:schemaRefs>
     <ds:schemaRef ds:uri="http://schemas.microsoft.com/office/2006/metadata/contentType"/>
@@ -43961,6 +43953,14 @@
 </ds:datastoreItem>
 </file>
 
+<file path=customXml/itemProps2.xml><?xml version="1.0" encoding="utf-8"?>
+<ds:datastoreItem xmlns:ds="http://schemas.openxmlformats.org/officeDocument/2006/customXml" ds:itemID="{7B9985E7-F7C6-4958-AABD-0B7F8BC31F4D}">
+  <ds:schemaRefs>
+    <ds:schemaRef ds:uri="http://schemas.microsoft.com/sharepoint/v3/contenttype/forms"/>
+  </ds:schemaRefs>
+</ds:datastoreItem>
+</file>
+
 <file path=customXml/itemProps3.xml><?xml version="1.0" encoding="utf-8"?>
 <ds:datastoreItem xmlns:ds="http://schemas.openxmlformats.org/officeDocument/2006/customXml" ds:itemID="{7D758C25-7188-4B86-83B4-902BBD715003}">
   <ds:schemaRefs>

</xml_diff>